<commit_message>
proposal and refine ppt
</commit_message>
<xml_diff>
--- a/slide_template/RS11023_Mailman_Standard_Template_12_2018.pptx
+++ b/slide_template/RS11023_Mailman_Standard_Template_12_2018.pptx
@@ -5,10 +5,10 @@
     <p:sldMasterId id="2147483917" r:id="rId1"/>
   </p:sldMasterIdLst>
   <p:notesMasterIdLst>
-    <p:notesMasterId r:id="rId14"/>
+    <p:notesMasterId r:id="rId17"/>
   </p:notesMasterIdLst>
   <p:handoutMasterIdLst>
-    <p:handoutMasterId r:id="rId15"/>
+    <p:handoutMasterId r:id="rId18"/>
   </p:handoutMasterIdLst>
   <p:sldIdLst>
     <p:sldId id="326" r:id="rId2"/>
@@ -18,11 +18,14 @@
     <p:sldId id="340" r:id="rId6"/>
     <p:sldId id="337" r:id="rId7"/>
     <p:sldId id="341" r:id="rId8"/>
-    <p:sldId id="338" r:id="rId9"/>
-    <p:sldId id="334" r:id="rId10"/>
-    <p:sldId id="330" r:id="rId11"/>
-    <p:sldId id="311" r:id="rId12"/>
-    <p:sldId id="312" r:id="rId13"/>
+    <p:sldId id="342" r:id="rId9"/>
+    <p:sldId id="338" r:id="rId10"/>
+    <p:sldId id="343" r:id="rId11"/>
+    <p:sldId id="344" r:id="rId12"/>
+    <p:sldId id="334" r:id="rId13"/>
+    <p:sldId id="330" r:id="rId14"/>
+    <p:sldId id="311" r:id="rId15"/>
+    <p:sldId id="312" r:id="rId16"/>
   </p:sldIdLst>
   <p:sldSz cx="9144000" cy="6858000" type="screen4x3"/>
   <p:notesSz cx="6858000" cy="9144000"/>
@@ -6300,6 +6303,812 @@
       </p:grpSpPr>
       <p:sp>
         <p:nvSpPr>
+          <p:cNvPr id="2" name="Text Placeholder 1">
+            <a:extLst>
+              <a:ext uri="{FF2B5EF4-FFF2-40B4-BE49-F238E27FC236}">
+                <a16:creationId xmlns:a16="http://schemas.microsoft.com/office/drawing/2014/main" id="{5664731D-935A-E747-B573-BE2F9FA6678D}"/>
+              </a:ext>
+            </a:extLst>
+          </p:cNvPr>
+          <p:cNvSpPr>
+            <a:spLocks noGrp="1"/>
+          </p:cNvSpPr>
+          <p:nvPr>
+            <p:ph type="body" sz="quarter" idx="12"/>
+          </p:nvPr>
+        </p:nvSpPr>
+        <p:spPr>
+          <a:xfrm>
+            <a:off x="685984" y="2128761"/>
+            <a:ext cx="8572684" cy="4309202"/>
+          </a:xfrm>
+        </p:spPr>
+        <p:txBody>
+          <a:bodyPr>
+            <a:normAutofit/>
+          </a:bodyPr>
+          <a:lstStyle/>
+          <a:p>
+            <a:r>
+              <a:rPr lang="en-US" altLang="zh-CN" sz="1800" dirty="0"/>
+              <a:t>5.1</a:t>
+            </a:r>
+            <a:r>
+              <a:rPr lang="zh-CN" altLang="en-US" sz="1800" dirty="0"/>
+              <a:t> </a:t>
+            </a:r>
+            <a:r>
+              <a:rPr lang="en-US" altLang="zh-CN" sz="1800" dirty="0"/>
+              <a:t>﻿Predictor identification performance</a:t>
+            </a:r>
+          </a:p>
+          <a:p>
+            <a:endParaRPr lang="en-US" sz="1800" dirty="0"/>
+          </a:p>
+          <a:p>
+            <a:endParaRPr lang="en-US" sz="1800" dirty="0"/>
+          </a:p>
+          <a:p>
+            <a:endParaRPr lang="en-US" sz="1800" dirty="0"/>
+          </a:p>
+          <a:p>
+            <a:endParaRPr lang="en-US" sz="1800" dirty="0"/>
+          </a:p>
+          <a:p>
+            <a:endParaRPr lang="en-US" sz="1800" dirty="0"/>
+          </a:p>
+          <a:p>
+            <a:r>
+              <a:rPr lang="en-US" altLang="zh-CN" sz="1800" dirty="0"/>
+              <a:t>	F1</a:t>
+            </a:r>
+            <a:r>
+              <a:rPr lang="zh-CN" altLang="en-US" sz="1800" dirty="0"/>
+              <a:t> </a:t>
+            </a:r>
+            <a:r>
+              <a:rPr lang="en-US" altLang="zh-CN" sz="1800" dirty="0"/>
+              <a:t>score</a:t>
+            </a:r>
+            <a:r>
+              <a:rPr lang="zh-CN" altLang="en-US" sz="1800" dirty="0"/>
+              <a:t> </a:t>
+            </a:r>
+            <a:r>
+              <a:rPr lang="en-US" altLang="zh-CN" sz="1800" dirty="0"/>
+              <a:t>is</a:t>
+            </a:r>
+            <a:r>
+              <a:rPr lang="zh-CN" altLang="en-US" sz="1800" dirty="0"/>
+              <a:t> </a:t>
+            </a:r>
+            <a:r>
+              <a:rPr lang="en-US" altLang="zh-CN" sz="1800" dirty="0"/>
+              <a:t>calculated</a:t>
+            </a:r>
+            <a:r>
+              <a:rPr lang="zh-CN" altLang="en-US" sz="1800" dirty="0"/>
+              <a:t> </a:t>
+            </a:r>
+            <a:r>
+              <a:rPr lang="en-US" altLang="zh-CN" sz="1800" dirty="0"/>
+              <a:t>in</a:t>
+            </a:r>
+            <a:r>
+              <a:rPr lang="zh-CN" altLang="en-US" sz="1800" dirty="0"/>
+              <a:t> </a:t>
+            </a:r>
+            <a:r>
+              <a:rPr lang="en-US" altLang="zh-CN" sz="1800" dirty="0"/>
+              <a:t>3</a:t>
+            </a:r>
+            <a:r>
+              <a:rPr lang="zh-CN" altLang="en-US" sz="1800" dirty="0"/>
+              <a:t> </a:t>
+            </a:r>
+            <a:r>
+              <a:rPr lang="en-US" altLang="zh-CN" sz="1800" dirty="0"/>
+              <a:t>categories</a:t>
+            </a:r>
+            <a:r>
+              <a:rPr lang="zh-CN" altLang="en-US" sz="1800" dirty="0"/>
+              <a:t> </a:t>
+            </a:r>
+            <a:r>
+              <a:rPr lang="en-US" altLang="zh-CN" sz="1800" dirty="0"/>
+              <a:t>separately.</a:t>
+            </a:r>
+            <a:r>
+              <a:rPr lang="zh-CN" altLang="en-US" sz="1800" dirty="0"/>
+              <a:t> </a:t>
+            </a:r>
+            <a:r>
+              <a:rPr lang="en-US" altLang="zh-CN" sz="1800" dirty="0"/>
+              <a:t>In</a:t>
+            </a:r>
+            <a:r>
+              <a:rPr lang="zh-CN" altLang="en-US" sz="1800" dirty="0"/>
+              <a:t> </a:t>
+            </a:r>
+            <a:r>
+              <a:rPr lang="en-US" altLang="zh-CN" sz="1800" dirty="0"/>
+              <a:t>strong</a:t>
+            </a:r>
+            <a:r>
+              <a:rPr lang="zh-CN" altLang="en-US" sz="1800" dirty="0"/>
+              <a:t> </a:t>
+            </a:r>
+            <a:r>
+              <a:rPr lang="en-US" altLang="zh-CN" sz="1800" dirty="0"/>
+              <a:t>cases,</a:t>
+            </a:r>
+            <a:r>
+              <a:rPr lang="zh-CN" altLang="en-US" sz="1800" dirty="0"/>
+              <a:t> </a:t>
+            </a:r>
+            <a:r>
+              <a:rPr lang="en-US" altLang="zh-CN" sz="1800" dirty="0"/>
+              <a:t>positive</a:t>
+            </a:r>
+            <a:r>
+              <a:rPr lang="zh-CN" altLang="en-US" sz="1800" dirty="0"/>
+              <a:t> </a:t>
+            </a:r>
+            <a:r>
+              <a:rPr lang="en-US" altLang="zh-CN" sz="1800" dirty="0"/>
+              <a:t>is?</a:t>
+            </a:r>
+            <a:r>
+              <a:rPr lang="zh-CN" altLang="en-US" sz="1800" dirty="0"/>
+              <a:t> </a:t>
+            </a:r>
+            <a:r>
+              <a:rPr lang="en-US" altLang="zh-CN" sz="1800" dirty="0"/>
+              <a:t>In</a:t>
+            </a:r>
+            <a:r>
+              <a:rPr lang="zh-CN" altLang="en-US" sz="1800" dirty="0"/>
+              <a:t> </a:t>
+            </a:r>
+            <a:r>
+              <a:rPr lang="en-US" altLang="zh-CN" sz="1800" dirty="0"/>
+              <a:t>weak</a:t>
+            </a:r>
+            <a:r>
+              <a:rPr lang="zh-CN" altLang="en-US" sz="1800" dirty="0"/>
+              <a:t> </a:t>
+            </a:r>
+            <a:r>
+              <a:rPr lang="en-US" altLang="zh-CN" sz="1800" dirty="0"/>
+              <a:t>cases,</a:t>
+            </a:r>
+            <a:r>
+              <a:rPr lang="zh-CN" altLang="en-US" sz="1800" dirty="0"/>
+              <a:t> </a:t>
+            </a:r>
+            <a:r>
+              <a:rPr lang="en-US" altLang="zh-CN" sz="1800" dirty="0"/>
+              <a:t>positive</a:t>
+            </a:r>
+            <a:r>
+              <a:rPr lang="zh-CN" altLang="en-US" sz="1800" dirty="0"/>
+              <a:t> </a:t>
+            </a:r>
+            <a:r>
+              <a:rPr lang="en-US" altLang="zh-CN" sz="1800" dirty="0"/>
+              <a:t>is</a:t>
+            </a:r>
+            <a:r>
+              <a:rPr lang="zh-CN" altLang="en-US" sz="1800" dirty="0"/>
+              <a:t> </a:t>
+            </a:r>
+            <a:r>
+              <a:rPr lang="en-US" altLang="zh-CN" sz="1800" dirty="0"/>
+              <a:t>?</a:t>
+            </a:r>
+            <a:endParaRPr lang="en-US" sz="1800" dirty="0"/>
+          </a:p>
+        </p:txBody>
+      </p:sp>
+      <p:sp>
+        <p:nvSpPr>
+          <p:cNvPr id="3" name="Title 2">
+            <a:extLst>
+              <a:ext uri="{FF2B5EF4-FFF2-40B4-BE49-F238E27FC236}">
+                <a16:creationId xmlns:a16="http://schemas.microsoft.com/office/drawing/2014/main" id="{D8B5670F-E5A2-DC48-BD74-D934E296554C}"/>
+              </a:ext>
+            </a:extLst>
+          </p:cNvPr>
+          <p:cNvSpPr>
+            <a:spLocks noGrp="1"/>
+          </p:cNvSpPr>
+          <p:nvPr>
+            <p:ph type="title"/>
+          </p:nvPr>
+        </p:nvSpPr>
+        <p:spPr/>
+        <p:txBody>
+          <a:bodyPr/>
+          <a:lstStyle/>
+          <a:p>
+            <a:r>
+              <a:rPr lang="en-US" altLang="zh-CN" dirty="0"/>
+              <a:t>5</a:t>
+            </a:r>
+            <a:r>
+              <a:rPr lang="zh-CN" altLang="en-US" dirty="0"/>
+              <a:t> </a:t>
+            </a:r>
+            <a:r>
+              <a:rPr lang="en-US" altLang="zh-CN" dirty="0"/>
+              <a:t>performance</a:t>
+            </a:r>
+            <a:r>
+              <a:rPr lang="zh-CN" altLang="en-US" dirty="0"/>
+              <a:t> </a:t>
+            </a:r>
+            <a:r>
+              <a:rPr lang="en-US" altLang="zh-CN" dirty="0"/>
+              <a:t>analysis</a:t>
+            </a:r>
+            <a:endParaRPr lang="en-US" dirty="0"/>
+          </a:p>
+        </p:txBody>
+      </p:sp>
+      <p:sp>
+        <p:nvSpPr>
+          <p:cNvPr id="4" name="Slide Number Placeholder 3">
+            <a:extLst>
+              <a:ext uri="{FF2B5EF4-FFF2-40B4-BE49-F238E27FC236}">
+                <a16:creationId xmlns:a16="http://schemas.microsoft.com/office/drawing/2014/main" id="{E7F6E81B-6B87-FC4C-ACD3-7B877A4CBE32}"/>
+              </a:ext>
+            </a:extLst>
+          </p:cNvPr>
+          <p:cNvSpPr>
+            <a:spLocks noGrp="1"/>
+          </p:cNvSpPr>
+          <p:nvPr>
+            <p:ph type="sldNum" sz="quarter" idx="4"/>
+          </p:nvPr>
+        </p:nvSpPr>
+        <p:spPr/>
+        <p:txBody>
+          <a:bodyPr/>
+          <a:lstStyle/>
+          <a:p>
+            <a:fld id="{DFF3CF64-7C58-ED48-B151-C0AF0EEF3592}" type="slidenum">
+              <a:rPr lang="en-US" smtClean="0"/>
+              <a:pPr/>
+              <a:t>10</a:t>
+            </a:fld>
+            <a:endParaRPr lang="en-US" dirty="0"/>
+          </a:p>
+        </p:txBody>
+      </p:sp>
+      <p:pic>
+        <p:nvPicPr>
+          <p:cNvPr id="6" name="Picture 5" descr="A screenshot of a cell phone&#10;&#10;Description automatically generated">
+            <a:extLst>
+              <a:ext uri="{FF2B5EF4-FFF2-40B4-BE49-F238E27FC236}">
+                <a16:creationId xmlns:a16="http://schemas.microsoft.com/office/drawing/2014/main" id="{A9EBD504-989A-AC4C-B114-CB07443E60D7}"/>
+              </a:ext>
+            </a:extLst>
+          </p:cNvPr>
+          <p:cNvPicPr>
+            <a:picLocks noChangeAspect="1"/>
+          </p:cNvPicPr>
+          <p:nvPr/>
+        </p:nvPicPr>
+        <p:blipFill>
+          <a:blip r:embed="rId2"/>
+          <a:stretch>
+            <a:fillRect/>
+          </a:stretch>
+        </p:blipFill>
+        <p:spPr>
+          <a:xfrm>
+            <a:off x="2766404" y="2638142"/>
+            <a:ext cx="3496524" cy="777005"/>
+          </a:xfrm>
+          <a:prstGeom prst="rect">
+            <a:avLst/>
+          </a:prstGeom>
+        </p:spPr>
+      </p:pic>
+      <p:pic>
+        <p:nvPicPr>
+          <p:cNvPr id="9" name="Picture 8" descr="A picture containing table&#10;&#10;Description automatically generated">
+            <a:extLst>
+              <a:ext uri="{FF2B5EF4-FFF2-40B4-BE49-F238E27FC236}">
+                <a16:creationId xmlns:a16="http://schemas.microsoft.com/office/drawing/2014/main" id="{0A0C912E-A046-E243-89C8-C858A4321BA8}"/>
+              </a:ext>
+            </a:extLst>
+          </p:cNvPr>
+          <p:cNvPicPr>
+            <a:picLocks noChangeAspect="1"/>
+          </p:cNvPicPr>
+          <p:nvPr/>
+        </p:nvPicPr>
+        <p:blipFill rotWithShape="1">
+          <a:blip r:embed="rId3"/>
+          <a:srcRect t="57449" b="-1"/>
+          <a:stretch/>
+        </p:blipFill>
+        <p:spPr>
+          <a:xfrm>
+            <a:off x="5050118" y="3676760"/>
+            <a:ext cx="1663882" cy="550925"/>
+          </a:xfrm>
+          <a:prstGeom prst="rect">
+            <a:avLst/>
+          </a:prstGeom>
+        </p:spPr>
+      </p:pic>
+      <p:pic>
+        <p:nvPicPr>
+          <p:cNvPr id="10" name="Picture 9" descr="A picture containing table&#10;&#10;Description automatically generated">
+            <a:extLst>
+              <a:ext uri="{FF2B5EF4-FFF2-40B4-BE49-F238E27FC236}">
+                <a16:creationId xmlns:a16="http://schemas.microsoft.com/office/drawing/2014/main" id="{8A54049D-A691-584F-9111-C5F09D4EEEB6}"/>
+              </a:ext>
+            </a:extLst>
+          </p:cNvPr>
+          <p:cNvPicPr>
+            <a:picLocks noChangeAspect="1"/>
+          </p:cNvPicPr>
+          <p:nvPr/>
+        </p:nvPicPr>
+        <p:blipFill rotWithShape="1">
+          <a:blip r:embed="rId3"/>
+          <a:srcRect b="54849"/>
+          <a:stretch/>
+        </p:blipFill>
+        <p:spPr>
+          <a:xfrm>
+            <a:off x="2432798" y="3676760"/>
+            <a:ext cx="1661085" cy="550925"/>
+          </a:xfrm>
+          <a:prstGeom prst="rect">
+            <a:avLst/>
+          </a:prstGeom>
+        </p:spPr>
+      </p:pic>
+    </p:spTree>
+    <p:extLst>
+      <p:ext uri="{BB962C8B-B14F-4D97-AF65-F5344CB8AC3E}">
+        <p14:creationId xmlns:p14="http://schemas.microsoft.com/office/powerpoint/2010/main" val="531522615"/>
+      </p:ext>
+    </p:extLst>
+  </p:cSld>
+  <p:clrMapOvr>
+    <a:masterClrMapping/>
+  </p:clrMapOvr>
+</p:sld>
+</file>
+
+<file path=ppt/slides/slide11.xml><?xml version="1.0" encoding="utf-8"?>
+<p:sld xmlns:a="http://schemas.openxmlformats.org/drawingml/2006/main" xmlns:r="http://schemas.openxmlformats.org/officeDocument/2006/relationships" xmlns:p="http://schemas.openxmlformats.org/presentationml/2006/main">
+  <p:cSld>
+    <p:spTree>
+      <p:nvGrpSpPr>
+        <p:cNvPr id="1" name=""/>
+        <p:cNvGrpSpPr/>
+        <p:nvPr/>
+      </p:nvGrpSpPr>
+      <p:grpSpPr>
+        <a:xfrm>
+          <a:off x="0" y="0"/>
+          <a:ext cx="0" cy="0"/>
+          <a:chOff x="0" y="0"/>
+          <a:chExt cx="0" cy="0"/>
+        </a:xfrm>
+      </p:grpSpPr>
+      <p:sp>
+        <p:nvSpPr>
+          <p:cNvPr id="2" name="Text Placeholder 1">
+            <a:extLst>
+              <a:ext uri="{FF2B5EF4-FFF2-40B4-BE49-F238E27FC236}">
+                <a16:creationId xmlns:a16="http://schemas.microsoft.com/office/drawing/2014/main" id="{5664731D-935A-E747-B573-BE2F9FA6678D}"/>
+              </a:ext>
+            </a:extLst>
+          </p:cNvPr>
+          <p:cNvSpPr>
+            <a:spLocks noGrp="1"/>
+          </p:cNvSpPr>
+          <p:nvPr>
+            <p:ph type="body" sz="quarter" idx="12"/>
+          </p:nvPr>
+        </p:nvSpPr>
+        <p:spPr>
+          <a:xfrm>
+            <a:off x="685984" y="2128761"/>
+            <a:ext cx="8572684" cy="4309202"/>
+          </a:xfrm>
+        </p:spPr>
+        <p:txBody>
+          <a:bodyPr>
+            <a:normAutofit/>
+          </a:bodyPr>
+          <a:lstStyle/>
+          <a:p>
+            <a:r>
+              <a:rPr lang="en-US" altLang="zh-CN" sz="1800" dirty="0"/>
+              <a:t>﻿5.2 estimation performance</a:t>
+            </a:r>
+          </a:p>
+          <a:p>
+            <a:r>
+              <a:rPr lang="en-US" altLang="zh-CN" sz="1800" dirty="0"/>
+              <a:t>For</a:t>
+            </a:r>
+            <a:r>
+              <a:rPr lang="zh-CN" altLang="en-US" sz="1800" dirty="0"/>
+              <a:t> </a:t>
+            </a:r>
+            <a:r>
+              <a:rPr lang="en-US" altLang="zh-CN" sz="1800" dirty="0"/>
+              <a:t>every</a:t>
+            </a:r>
+            <a:r>
+              <a:rPr lang="zh-CN" altLang="en-US" sz="1800" dirty="0"/>
+              <a:t> </a:t>
+            </a:r>
+            <a:r>
+              <a:rPr lang="en-US" altLang="zh-CN" sz="1800" dirty="0"/>
+              <a:t>scenario:</a:t>
+            </a:r>
+          </a:p>
+          <a:p>
+            <a:pPr marL="285750" indent="-285750">
+              <a:buFont typeface="Arial" panose="020B0604020202020204" pitchFamily="34" charset="0"/>
+              <a:buChar char="•"/>
+            </a:pPr>
+            <a:r>
+              <a:rPr lang="en-US" altLang="zh-CN" sz="1800" dirty="0"/>
+              <a:t>Bias</a:t>
+            </a:r>
+            <a:r>
+              <a:rPr lang="zh-CN" altLang="en-US" sz="1800" dirty="0"/>
+              <a:t> </a:t>
+            </a:r>
+            <a:endParaRPr lang="en-US" altLang="zh-CN" sz="1800" dirty="0"/>
+          </a:p>
+          <a:p>
+            <a:endParaRPr lang="en-US" altLang="zh-CN" sz="1800" dirty="0"/>
+          </a:p>
+          <a:p>
+            <a:pPr marL="285750" indent="-285750">
+              <a:buFont typeface="Arial" panose="020B0604020202020204" pitchFamily="34" charset="0"/>
+              <a:buChar char="•"/>
+            </a:pPr>
+            <a:r>
+              <a:rPr lang="en-US" altLang="zh-CN" sz="1800" dirty="0"/>
+              <a:t>Variance</a:t>
+            </a:r>
+          </a:p>
+          <a:p>
+            <a:endParaRPr lang="en-US" altLang="zh-CN" sz="1800" dirty="0"/>
+          </a:p>
+          <a:p>
+            <a:pPr marL="285750" indent="-285750">
+              <a:buFont typeface="Arial" panose="020B0604020202020204" pitchFamily="34" charset="0"/>
+              <a:buChar char="•"/>
+            </a:pPr>
+            <a:r>
+              <a:rPr lang="en-US" altLang="zh-CN" sz="1800" dirty="0"/>
+              <a:t>MSE</a:t>
+            </a:r>
+            <a:endParaRPr lang="en-US" sz="1800" dirty="0"/>
+          </a:p>
+          <a:p>
+            <a:endParaRPr lang="en-US" sz="1800" dirty="0"/>
+          </a:p>
+        </p:txBody>
+      </p:sp>
+      <p:sp>
+        <p:nvSpPr>
+          <p:cNvPr id="3" name="Title 2">
+            <a:extLst>
+              <a:ext uri="{FF2B5EF4-FFF2-40B4-BE49-F238E27FC236}">
+                <a16:creationId xmlns:a16="http://schemas.microsoft.com/office/drawing/2014/main" id="{D8B5670F-E5A2-DC48-BD74-D934E296554C}"/>
+              </a:ext>
+            </a:extLst>
+          </p:cNvPr>
+          <p:cNvSpPr>
+            <a:spLocks noGrp="1"/>
+          </p:cNvSpPr>
+          <p:nvPr>
+            <p:ph type="title"/>
+          </p:nvPr>
+        </p:nvSpPr>
+        <p:spPr/>
+        <p:txBody>
+          <a:bodyPr/>
+          <a:lstStyle/>
+          <a:p>
+            <a:r>
+              <a:rPr lang="en-US" altLang="zh-CN" dirty="0"/>
+              <a:t>5</a:t>
+            </a:r>
+            <a:r>
+              <a:rPr lang="zh-CN" altLang="en-US" dirty="0"/>
+              <a:t> </a:t>
+            </a:r>
+            <a:r>
+              <a:rPr lang="en-US" altLang="zh-CN" dirty="0"/>
+              <a:t>performance</a:t>
+            </a:r>
+            <a:r>
+              <a:rPr lang="zh-CN" altLang="en-US" dirty="0"/>
+              <a:t> </a:t>
+            </a:r>
+            <a:r>
+              <a:rPr lang="en-US" altLang="zh-CN" dirty="0"/>
+              <a:t>analysis</a:t>
+            </a:r>
+            <a:endParaRPr lang="en-US" dirty="0"/>
+          </a:p>
+        </p:txBody>
+      </p:sp>
+      <p:sp>
+        <p:nvSpPr>
+          <p:cNvPr id="4" name="Slide Number Placeholder 3">
+            <a:extLst>
+              <a:ext uri="{FF2B5EF4-FFF2-40B4-BE49-F238E27FC236}">
+                <a16:creationId xmlns:a16="http://schemas.microsoft.com/office/drawing/2014/main" id="{E7F6E81B-6B87-FC4C-ACD3-7B877A4CBE32}"/>
+              </a:ext>
+            </a:extLst>
+          </p:cNvPr>
+          <p:cNvSpPr>
+            <a:spLocks noGrp="1"/>
+          </p:cNvSpPr>
+          <p:nvPr>
+            <p:ph type="sldNum" sz="quarter" idx="4"/>
+          </p:nvPr>
+        </p:nvSpPr>
+        <p:spPr/>
+        <p:txBody>
+          <a:bodyPr/>
+          <a:lstStyle/>
+          <a:p>
+            <a:fld id="{DFF3CF64-7C58-ED48-B151-C0AF0EEF3592}" type="slidenum">
+              <a:rPr lang="en-US" smtClean="0"/>
+              <a:pPr/>
+              <a:t>11</a:t>
+            </a:fld>
+            <a:endParaRPr lang="en-US" dirty="0"/>
+          </a:p>
+        </p:txBody>
+      </p:sp>
+      <p:pic>
+        <p:nvPicPr>
+          <p:cNvPr id="7" name="Picture 6" descr="A picture containing clock&#10;&#10;Description automatically generated">
+            <a:extLst>
+              <a:ext uri="{FF2B5EF4-FFF2-40B4-BE49-F238E27FC236}">
+                <a16:creationId xmlns:a16="http://schemas.microsoft.com/office/drawing/2014/main" id="{4ED15279-2DB1-D246-88C7-581CDA7DB80C}"/>
+              </a:ext>
+            </a:extLst>
+          </p:cNvPr>
+          <p:cNvPicPr>
+            <a:picLocks noChangeAspect="1"/>
+          </p:cNvPicPr>
+          <p:nvPr/>
+        </p:nvPicPr>
+        <p:blipFill rotWithShape="1">
+          <a:blip r:embed="rId2"/>
+          <a:srcRect b="73923"/>
+          <a:stretch/>
+        </p:blipFill>
+        <p:spPr>
+          <a:xfrm>
+            <a:off x="3133368" y="2733508"/>
+            <a:ext cx="1381298" cy="861606"/>
+          </a:xfrm>
+          <a:prstGeom prst="rect">
+            <a:avLst/>
+          </a:prstGeom>
+        </p:spPr>
+      </p:pic>
+      <p:pic>
+        <p:nvPicPr>
+          <p:cNvPr id="11" name="Picture 10" descr="A picture containing clock&#10;&#10;Description automatically generated">
+            <a:extLst>
+              <a:ext uri="{FF2B5EF4-FFF2-40B4-BE49-F238E27FC236}">
+                <a16:creationId xmlns:a16="http://schemas.microsoft.com/office/drawing/2014/main" id="{53E97FE5-2129-2D46-A245-A6B17F063616}"/>
+              </a:ext>
+            </a:extLst>
+          </p:cNvPr>
+          <p:cNvPicPr>
+            <a:picLocks noChangeAspect="1"/>
+          </p:cNvPicPr>
+          <p:nvPr/>
+        </p:nvPicPr>
+        <p:blipFill rotWithShape="1">
+          <a:blip r:embed="rId2"/>
+          <a:srcRect t="81579"/>
+          <a:stretch/>
+        </p:blipFill>
+        <p:spPr>
+          <a:xfrm>
+            <a:off x="3189778" y="4977142"/>
+            <a:ext cx="1382222" cy="609047"/>
+          </a:xfrm>
+          <a:prstGeom prst="rect">
+            <a:avLst/>
+          </a:prstGeom>
+        </p:spPr>
+      </p:pic>
+      <p:pic>
+        <p:nvPicPr>
+          <p:cNvPr id="12" name="Picture 11" descr="A picture containing clock&#10;&#10;Description automatically generated">
+            <a:extLst>
+              <a:ext uri="{FF2B5EF4-FFF2-40B4-BE49-F238E27FC236}">
+                <a16:creationId xmlns:a16="http://schemas.microsoft.com/office/drawing/2014/main" id="{1BF5E729-FE6A-7D44-A7CF-80AB7C6863C5}"/>
+              </a:ext>
+            </a:extLst>
+          </p:cNvPr>
+          <p:cNvPicPr>
+            <a:picLocks noChangeAspect="1"/>
+          </p:cNvPicPr>
+          <p:nvPr/>
+        </p:nvPicPr>
+        <p:blipFill rotWithShape="1">
+          <a:blip r:embed="rId2"/>
+          <a:srcRect t="43321" b="38258"/>
+          <a:stretch/>
+        </p:blipFill>
+        <p:spPr>
+          <a:xfrm>
+            <a:off x="3189778" y="3897651"/>
+            <a:ext cx="1382222" cy="609047"/>
+          </a:xfrm>
+          <a:prstGeom prst="rect">
+            <a:avLst/>
+          </a:prstGeom>
+        </p:spPr>
+      </p:pic>
+    </p:spTree>
+    <p:extLst>
+      <p:ext uri="{BB962C8B-B14F-4D97-AF65-F5344CB8AC3E}">
+        <p14:creationId xmlns:p14="http://schemas.microsoft.com/office/powerpoint/2010/main" val="1256265663"/>
+      </p:ext>
+    </p:extLst>
+  </p:cSld>
+  <p:clrMapOvr>
+    <a:masterClrMapping/>
+  </p:clrMapOvr>
+</p:sld>
+</file>
+
+<file path=ppt/slides/slide12.xml><?xml version="1.0" encoding="utf-8"?>
+<p:sld xmlns:a="http://schemas.openxmlformats.org/drawingml/2006/main" xmlns:r="http://schemas.openxmlformats.org/officeDocument/2006/relationships" xmlns:p="http://schemas.openxmlformats.org/presentationml/2006/main">
+  <p:cSld>
+    <p:spTree>
+      <p:nvGrpSpPr>
+        <p:cNvPr id="1" name=""/>
+        <p:cNvGrpSpPr/>
+        <p:nvPr/>
+      </p:nvGrpSpPr>
+      <p:grpSpPr>
+        <a:xfrm>
+          <a:off x="0" y="0"/>
+          <a:ext cx="0" cy="0"/>
+          <a:chOff x="0" y="0"/>
+          <a:chExt cx="0" cy="0"/>
+        </a:xfrm>
+      </p:grpSpPr>
+      <p:sp>
+        <p:nvSpPr>
+          <p:cNvPr id="2" name="Text Placeholder 1">
+            <a:extLst>
+              <a:ext uri="{FF2B5EF4-FFF2-40B4-BE49-F238E27FC236}">
+                <a16:creationId xmlns:a16="http://schemas.microsoft.com/office/drawing/2014/main" id="{7810FCFE-4A3E-3C4A-B610-DFFEE6DDC87F}"/>
+              </a:ext>
+            </a:extLst>
+          </p:cNvPr>
+          <p:cNvSpPr>
+            <a:spLocks noGrp="1"/>
+          </p:cNvSpPr>
+          <p:nvPr>
+            <p:ph type="body" sz="quarter" idx="16"/>
+          </p:nvPr>
+        </p:nvSpPr>
+        <p:spPr/>
+        <p:txBody>
+          <a:bodyPr/>
+          <a:lstStyle/>
+          <a:p>
+            <a:endParaRPr lang="en-US"/>
+          </a:p>
+        </p:txBody>
+      </p:sp>
+      <p:sp>
+        <p:nvSpPr>
+          <p:cNvPr id="3" name="Title 2">
+            <a:extLst>
+              <a:ext uri="{FF2B5EF4-FFF2-40B4-BE49-F238E27FC236}">
+                <a16:creationId xmlns:a16="http://schemas.microsoft.com/office/drawing/2014/main" id="{EB31DDBC-00AE-AA47-8CE8-918ACDA420FC}"/>
+              </a:ext>
+            </a:extLst>
+          </p:cNvPr>
+          <p:cNvSpPr>
+            <a:spLocks noGrp="1"/>
+          </p:cNvSpPr>
+          <p:nvPr>
+            <p:ph type="title"/>
+          </p:nvPr>
+        </p:nvSpPr>
+        <p:spPr/>
+        <p:txBody>
+          <a:bodyPr/>
+          <a:lstStyle/>
+          <a:p>
+            <a:endParaRPr lang="en-US"/>
+          </a:p>
+        </p:txBody>
+      </p:sp>
+      <p:sp>
+        <p:nvSpPr>
+          <p:cNvPr id="4" name="Slide Number Placeholder 3">
+            <a:extLst>
+              <a:ext uri="{FF2B5EF4-FFF2-40B4-BE49-F238E27FC236}">
+                <a16:creationId xmlns:a16="http://schemas.microsoft.com/office/drawing/2014/main" id="{0A38B8D0-C4D5-044C-82F5-D03FE1776217}"/>
+              </a:ext>
+            </a:extLst>
+          </p:cNvPr>
+          <p:cNvSpPr>
+            <a:spLocks noGrp="1"/>
+          </p:cNvSpPr>
+          <p:nvPr>
+            <p:ph type="sldNum" sz="quarter" idx="4"/>
+          </p:nvPr>
+        </p:nvSpPr>
+        <p:spPr/>
+        <p:txBody>
+          <a:bodyPr/>
+          <a:lstStyle/>
+          <a:p>
+            <a:fld id="{DFF3CF64-7C58-ED48-B151-C0AF0EEF3592}" type="slidenum">
+              <a:rPr lang="en-US" smtClean="0"/>
+              <a:pPr/>
+              <a:t>12</a:t>
+            </a:fld>
+            <a:endParaRPr lang="en-US" dirty="0"/>
+          </a:p>
+        </p:txBody>
+      </p:sp>
+    </p:spTree>
+    <p:extLst>
+      <p:ext uri="{BB962C8B-B14F-4D97-AF65-F5344CB8AC3E}">
+        <p14:creationId xmlns:p14="http://schemas.microsoft.com/office/powerpoint/2010/main" val="2348281500"/>
+      </p:ext>
+    </p:extLst>
+  </p:cSld>
+  <p:clrMapOvr>
+    <a:masterClrMapping/>
+  </p:clrMapOvr>
+</p:sld>
+</file>
+
+<file path=ppt/slides/slide13.xml><?xml version="1.0" encoding="utf-8"?>
+<p:sld xmlns:a="http://schemas.openxmlformats.org/drawingml/2006/main" xmlns:r="http://schemas.openxmlformats.org/officeDocument/2006/relationships" xmlns:p="http://schemas.openxmlformats.org/presentationml/2006/main">
+  <p:cSld>
+    <p:spTree>
+      <p:nvGrpSpPr>
+        <p:cNvPr id="1" name=""/>
+        <p:cNvGrpSpPr/>
+        <p:nvPr/>
+      </p:nvGrpSpPr>
+      <p:grpSpPr>
+        <a:xfrm>
+          <a:off x="0" y="0"/>
+          <a:ext cx="0" cy="0"/>
+          <a:chOff x="0" y="0"/>
+          <a:chExt cx="0" cy="0"/>
+        </a:xfrm>
+      </p:grpSpPr>
+      <p:sp>
+        <p:nvSpPr>
           <p:cNvPr id="7" name="Picture Placeholder 6">
             <a:extLst>
               <a:ext uri="{FF2B5EF4-FFF2-40B4-BE49-F238E27FC236}">
@@ -6390,7 +7199,7 @@
             <a:fld id="{DFF3CF64-7C58-ED48-B151-C0AF0EEF3592}" type="slidenum">
               <a:rPr lang="en-US" smtClean="0"/>
               <a:pPr/>
-              <a:t>10</a:t>
+              <a:t>13</a:t>
             </a:fld>
             <a:endParaRPr lang="en-US" dirty="0"/>
           </a:p>
@@ -6409,7 +7218,7 @@
 </p:sld>
 </file>
 
-<file path=ppt/slides/slide11.xml><?xml version="1.0" encoding="utf-8"?>
+<file path=ppt/slides/slide14.xml><?xml version="1.0" encoding="utf-8"?>
 <p:sld xmlns:a="http://schemas.openxmlformats.org/drawingml/2006/main" xmlns:r="http://schemas.openxmlformats.org/officeDocument/2006/relationships" xmlns:p="http://schemas.openxmlformats.org/presentationml/2006/main">
   <p:cSld>
     <p:spTree>
@@ -6449,7 +7258,7 @@
             <a:fld id="{DFF3CF64-7C58-ED48-B151-C0AF0EEF3592}" type="slidenum">
               <a:rPr lang="en-US" smtClean="0"/>
               <a:pPr/>
-              <a:t>11</a:t>
+              <a:t>14</a:t>
             </a:fld>
             <a:endParaRPr lang="en-US" dirty="0"/>
           </a:p>
@@ -6491,7 +7300,7 @@
 </p:sld>
 </file>
 
-<file path=ppt/slides/slide12.xml><?xml version="1.0" encoding="utf-8"?>
+<file path=ppt/slides/slide15.xml><?xml version="1.0" encoding="utf-8"?>
 <p:sld xmlns:a="http://schemas.openxmlformats.org/drawingml/2006/main" xmlns:r="http://schemas.openxmlformats.org/officeDocument/2006/relationships" xmlns:p="http://schemas.openxmlformats.org/presentationml/2006/main">
   <p:cSld>
     <p:spTree>
@@ -6880,7 +7689,7 @@
             <a:fld id="{DFF3CF64-7C58-ED48-B151-C0AF0EEF3592}" type="slidenum">
               <a:rPr lang="en-US" smtClean="0"/>
               <a:pPr/>
-              <a:t>12</a:t>
+              <a:t>15</a:t>
             </a:fld>
             <a:endParaRPr lang="en-US" dirty="0"/>
           </a:p>
@@ -7998,37 +8807,37 @@
         </p:nvSpPr>
         <p:spPr>
           <a:xfrm>
-            <a:off x="685984" y="1605538"/>
-            <a:ext cx="8572684" cy="4309202"/>
+            <a:off x="571316" y="1605538"/>
+            <a:ext cx="8687352" cy="4309202"/>
           </a:xfrm>
         </p:spPr>
         <p:txBody>
           <a:bodyPr>
-            <a:normAutofit fontScale="92500" lnSpcReduction="10000"/>
+            <a:normAutofit/>
           </a:bodyPr>
           <a:lstStyle/>
           <a:p>
             <a:r>
-              <a:rPr lang="en-US" altLang="zh-CN" sz="2400" dirty="0"/>
+              <a:rPr lang="en-US" altLang="zh-CN" sz="2000" dirty="0"/>
               <a:t>3.2</a:t>
             </a:r>
             <a:r>
-              <a:rPr lang="zh-CN" altLang="en-US" sz="2400" dirty="0"/>
-              <a:t> </a:t>
-            </a:r>
-            <a:r>
-              <a:rPr lang="en-US" altLang="zh-CN" sz="2400" dirty="0"/>
+              <a:rPr lang="zh-CN" altLang="en-US" sz="2000" dirty="0"/>
+              <a:t> </a:t>
+            </a:r>
+            <a:r>
+              <a:rPr lang="en-US" altLang="zh-CN" sz="2000" dirty="0"/>
               <a:t>tuning</a:t>
             </a:r>
             <a:r>
-              <a:rPr lang="zh-CN" altLang="en-US" sz="2400" dirty="0"/>
-              <a:t> </a:t>
-            </a:r>
-            <a:r>
-              <a:rPr lang="en-US" altLang="zh-CN" sz="2400" dirty="0"/>
+              <a:rPr lang="zh-CN" altLang="en-US" sz="2000" dirty="0"/>
+              <a:t> </a:t>
+            </a:r>
+            <a:r>
+              <a:rPr lang="en-US" altLang="zh-CN" sz="2000" dirty="0"/>
               <a:t>parameter</a:t>
             </a:r>
-            <a:endParaRPr lang="en-US" sz="2400" dirty="0"/>
+            <a:endParaRPr lang="en-US" sz="2000" dirty="0"/>
           </a:p>
           <a:p>
             <a:pPr marL="285750" indent="-285750">
@@ -8036,38 +8845,38 @@
               <a:buChar char="•"/>
             </a:pPr>
             <a:r>
-              <a:rPr lang="en-US" altLang="zh-CN" sz="1800" dirty="0"/>
+              <a:rPr lang="en-US" altLang="zh-CN" sz="1800" b="1" dirty="0"/>
               <a:t>Sample</a:t>
             </a:r>
             <a:r>
-              <a:rPr lang="zh-CN" altLang="en-US" sz="1800" dirty="0"/>
-              <a:t> </a:t>
-            </a:r>
-            <a:r>
-              <a:rPr lang="en-US" altLang="zh-CN" sz="1800" dirty="0"/>
+              <a:rPr lang="zh-CN" altLang="en-US" sz="1800" b="1" dirty="0"/>
+              <a:t> </a:t>
+            </a:r>
+            <a:r>
+              <a:rPr lang="en-US" altLang="zh-CN" sz="1800" b="1" dirty="0"/>
               <a:t>size:</a:t>
             </a:r>
             <a:r>
-              <a:rPr lang="zh-CN" altLang="en-US" sz="1800" dirty="0"/>
-              <a:t> </a:t>
-            </a:r>
-            <a:endParaRPr lang="en-US" altLang="zh-CN" sz="1800" dirty="0"/>
+              <a:rPr lang="zh-CN" altLang="en-US" sz="1800" b="1" dirty="0"/>
+              <a:t> </a:t>
+            </a:r>
+            <a:endParaRPr lang="en-US" altLang="zh-CN" sz="1800" b="1" dirty="0"/>
           </a:p>
           <a:p>
             <a:pPr lvl="1" indent="0">
               <a:buNone/>
             </a:pPr>
             <a:r>
-              <a:rPr lang="en-US" altLang="zh-CN" sz="1800" dirty="0"/>
+              <a:rPr lang="en-US" altLang="zh-CN" dirty="0"/>
               <a:t>1)</a:t>
             </a:r>
             <a:r>
-              <a:rPr lang="zh-CN" altLang="en-US" sz="1800" dirty="0"/>
-              <a:t> </a:t>
-            </a:r>
-            <a:r>
-              <a:rPr lang="en-US" sz="1800" dirty="0"/>
-              <a:t>n = 200,</a:t>
+              <a:rPr lang="zh-CN" altLang="en-US" dirty="0"/>
+              <a:t> </a:t>
+            </a:r>
+            <a:r>
+              <a:rPr lang="en-US" dirty="0"/>
+              <a:t>n = 200</a:t>
             </a:r>
           </a:p>
           <a:p>
@@ -8075,32 +8884,32 @@
               <a:buNone/>
             </a:pPr>
             <a:r>
-              <a:rPr lang="en-US" altLang="zh-CN" sz="1800" dirty="0"/>
+              <a:rPr lang="en-US" altLang="zh-CN" dirty="0"/>
               <a:t>2)</a:t>
             </a:r>
             <a:r>
-              <a:rPr lang="zh-CN" altLang="en-US" sz="1800" dirty="0"/>
-              <a:t> </a:t>
-            </a:r>
-            <a:r>
-              <a:rPr lang="en-US" altLang="zh-CN" sz="1800" dirty="0"/>
+              <a:rPr lang="zh-CN" altLang="en-US" dirty="0"/>
+              <a:t> </a:t>
+            </a:r>
+            <a:r>
+              <a:rPr lang="en-US" altLang="zh-CN" dirty="0"/>
               <a:t>n</a:t>
             </a:r>
             <a:r>
-              <a:rPr lang="zh-CN" altLang="en-US" sz="1800" dirty="0"/>
-              <a:t> </a:t>
-            </a:r>
-            <a:r>
-              <a:rPr lang="en-US" altLang="zh-CN" sz="1800" dirty="0"/>
+              <a:rPr lang="zh-CN" altLang="en-US" dirty="0"/>
+              <a:t> </a:t>
+            </a:r>
+            <a:r>
+              <a:rPr lang="en-US" altLang="zh-CN" dirty="0"/>
               <a:t>=</a:t>
             </a:r>
             <a:r>
-              <a:rPr lang="zh-CN" altLang="en-US" sz="1800" dirty="0"/>
-              <a:t> </a:t>
-            </a:r>
-            <a:r>
-              <a:rPr lang="en-US" sz="1800" dirty="0"/>
-              <a:t>1000, </a:t>
+              <a:rPr lang="zh-CN" altLang="en-US" dirty="0"/>
+              <a:t> </a:t>
+            </a:r>
+            <a:r>
+              <a:rPr lang="en-US" dirty="0"/>
+              <a:t>1000</a:t>
             </a:r>
           </a:p>
           <a:p>
@@ -8108,29 +8917,30 @@
               <a:buNone/>
             </a:pPr>
             <a:r>
-              <a:rPr lang="en-US" altLang="zh-CN" sz="1800" dirty="0"/>
+              <a:rPr lang="en-US" altLang="zh-CN" dirty="0"/>
               <a:t>3)</a:t>
             </a:r>
             <a:r>
-              <a:rPr lang="zh-CN" altLang="en-US" sz="1800" dirty="0"/>
-              <a:t> </a:t>
-            </a:r>
-            <a:r>
-              <a:rPr lang="en-US" altLang="zh-CN" sz="1800" dirty="0"/>
+              <a:rPr lang="zh-CN" altLang="en-US" dirty="0"/>
+              <a:t> </a:t>
+            </a:r>
+            <a:r>
+              <a:rPr lang="en-US" altLang="zh-CN" dirty="0"/>
               <a:t>n</a:t>
             </a:r>
             <a:r>
-              <a:rPr lang="zh-CN" altLang="en-US" sz="1800" dirty="0"/>
-              <a:t> </a:t>
-            </a:r>
-            <a:r>
-              <a:rPr lang="en-US" altLang="zh-CN" sz="1800" dirty="0"/>
+              <a:rPr lang="zh-CN" altLang="en-US" dirty="0"/>
+              <a:t> </a:t>
+            </a:r>
+            <a:r>
+              <a:rPr lang="en-US" altLang="zh-CN" dirty="0"/>
               <a:t>= </a:t>
             </a:r>
             <a:r>
-              <a:rPr lang="en-US" sz="1800" dirty="0"/>
+              <a:rPr lang="en-US" dirty="0"/>
               <a:t>5000</a:t>
             </a:r>
+            <a:endParaRPr lang="en-US" sz="1800" dirty="0"/>
           </a:p>
           <a:p>
             <a:pPr marL="285750" indent="-285750">
@@ -8138,232 +8948,228 @@
               <a:buChar char="•"/>
             </a:pPr>
             <a:r>
-              <a:rPr lang="en-US" altLang="zh-CN" sz="1800" dirty="0"/>
+              <a:rPr lang="en-US" altLang="zh-CN" sz="1800" b="1" dirty="0"/>
               <a:t>Strength</a:t>
             </a:r>
             <a:r>
+              <a:rPr lang="zh-CN" altLang="en-US" sz="1800" b="1" dirty="0"/>
+              <a:t> </a:t>
+            </a:r>
+            <a:r>
+              <a:rPr lang="en-US" altLang="zh-CN" sz="1800" b="1" dirty="0"/>
+              <a:t>predictors</a:t>
+            </a:r>
+            <a:r>
+              <a:rPr lang="zh-CN" altLang="en-US" sz="1800" b="1" dirty="0"/>
+              <a:t> </a:t>
+            </a:r>
+            <a:r>
+              <a:rPr lang="en-US" altLang="zh-CN" sz="1800" b="1" dirty="0"/>
+              <a:t>ratio:</a:t>
+            </a:r>
+          </a:p>
+          <a:p>
+            <a:r>
               <a:rPr lang="zh-CN" altLang="en-US" sz="1800" dirty="0"/>
               <a:t> </a:t>
             </a:r>
             <a:r>
-              <a:rPr lang="en-US" altLang="zh-CN" sz="1800" dirty="0"/>
+              <a:rPr lang="en-US" altLang="zh-CN" sz="1500" dirty="0"/>
+              <a:t>The</a:t>
+            </a:r>
+            <a:r>
+              <a:rPr lang="zh-CN" altLang="en-US" sz="1500" dirty="0"/>
+              <a:t> </a:t>
+            </a:r>
+            <a:r>
+              <a:rPr lang="en-US" altLang="zh-CN" sz="1500" dirty="0"/>
+              <a:t>total</a:t>
+            </a:r>
+            <a:r>
+              <a:rPr lang="zh-CN" altLang="en-US" sz="1500" dirty="0"/>
+              <a:t> </a:t>
+            </a:r>
+            <a:r>
+              <a:rPr lang="en-US" altLang="zh-CN" sz="1500" dirty="0"/>
+              <a:t>number</a:t>
+            </a:r>
+            <a:r>
+              <a:rPr lang="zh-CN" altLang="en-US" sz="1500" dirty="0"/>
+              <a:t> </a:t>
+            </a:r>
+            <a:r>
+              <a:rPr lang="en-US" altLang="zh-CN" sz="1500" dirty="0"/>
+              <a:t>of</a:t>
+            </a:r>
+            <a:r>
+              <a:rPr lang="zh-CN" altLang="en-US" sz="1500" dirty="0"/>
+              <a:t> </a:t>
+            </a:r>
+            <a:r>
+              <a:rPr lang="en-US" altLang="zh-CN" sz="1500" dirty="0"/>
               <a:t>predictors</a:t>
             </a:r>
             <a:r>
-              <a:rPr lang="zh-CN" altLang="en-US" sz="1800" dirty="0"/>
-              <a:t> </a:t>
-            </a:r>
-            <a:r>
-              <a:rPr lang="en-US" altLang="zh-CN" sz="1800" dirty="0"/>
-              <a:t>ratio:</a:t>
-            </a:r>
-          </a:p>
-          <a:p>
-            <a:r>
-              <a:rPr lang="zh-CN" altLang="en-US" sz="1800" dirty="0"/>
-              <a:t> </a:t>
-            </a:r>
-            <a:r>
-              <a:rPr lang="en-US" altLang="zh-CN" sz="1800" dirty="0"/>
-              <a:t>The</a:t>
-            </a:r>
-            <a:r>
-              <a:rPr lang="zh-CN" altLang="en-US" sz="1800" dirty="0"/>
-              <a:t> </a:t>
-            </a:r>
-            <a:r>
-              <a:rPr lang="en-US" altLang="zh-CN" sz="1800" dirty="0"/>
-              <a:t>total</a:t>
-            </a:r>
-            <a:r>
-              <a:rPr lang="zh-CN" altLang="en-US" sz="1800" dirty="0"/>
-              <a:t> </a:t>
-            </a:r>
-            <a:r>
-              <a:rPr lang="en-US" altLang="zh-CN" sz="1800" dirty="0"/>
-              <a:t>number</a:t>
-            </a:r>
-            <a:r>
-              <a:rPr lang="zh-CN" altLang="en-US" sz="1800" dirty="0"/>
-              <a:t> </a:t>
-            </a:r>
-            <a:r>
-              <a:rPr lang="en-US" altLang="zh-CN" sz="1800" dirty="0"/>
-              <a:t>of</a:t>
-            </a:r>
-            <a:r>
-              <a:rPr lang="zh-CN" altLang="en-US" sz="1800" dirty="0"/>
-              <a:t> </a:t>
-            </a:r>
-            <a:r>
-              <a:rPr lang="en-US" altLang="zh-CN" sz="1800" dirty="0"/>
+              <a:rPr lang="zh-CN" altLang="en-US" sz="1500" dirty="0"/>
+              <a:t> </a:t>
+            </a:r>
+            <a:r>
+              <a:rPr lang="en-US" altLang="zh-CN" sz="1500" dirty="0"/>
+              <a:t>are</a:t>
+            </a:r>
+            <a:r>
+              <a:rPr lang="zh-CN" altLang="en-US" sz="1500" dirty="0"/>
+              <a:t> </a:t>
+            </a:r>
+            <a:r>
+              <a:rPr lang="en-US" altLang="zh-CN" sz="1500" dirty="0"/>
+              <a:t>200,</a:t>
+            </a:r>
+            <a:r>
+              <a:rPr lang="zh-CN" altLang="en-US" sz="1500" dirty="0"/>
+              <a:t> </a:t>
+            </a:r>
+            <a:r>
+              <a:rPr lang="en-US" altLang="zh-CN" sz="1500" dirty="0"/>
+              <a:t>where</a:t>
+            </a:r>
+            <a:r>
+              <a:rPr lang="zh-CN" altLang="en-US" sz="1500" dirty="0"/>
+              <a:t> </a:t>
+            </a:r>
+            <a:r>
+              <a:rPr lang="en-US" altLang="zh-CN" sz="1500" dirty="0"/>
+              <a:t>100</a:t>
+            </a:r>
+            <a:r>
+              <a:rPr lang="zh-CN" altLang="en-US" sz="1500" dirty="0"/>
+              <a:t> </a:t>
+            </a:r>
+            <a:r>
+              <a:rPr lang="en-US" altLang="zh-CN" sz="1500" dirty="0"/>
+              <a:t>are</a:t>
+            </a:r>
+            <a:r>
+              <a:rPr lang="zh-CN" altLang="en-US" sz="1500" dirty="0"/>
+              <a:t> </a:t>
+            </a:r>
+            <a:r>
+              <a:rPr lang="en-US" altLang="zh-CN" sz="1500" dirty="0"/>
+              <a:t>noise</a:t>
+            </a:r>
+            <a:r>
+              <a:rPr lang="zh-CN" altLang="en-US" sz="1500" dirty="0"/>
+              <a:t> </a:t>
+            </a:r>
+            <a:r>
+              <a:rPr lang="en-US" altLang="zh-CN" sz="1500" dirty="0"/>
+              <a:t>predictors.</a:t>
+            </a:r>
+            <a:r>
+              <a:rPr lang="zh-CN" altLang="en-US" sz="1500" dirty="0"/>
+              <a:t> </a:t>
+            </a:r>
+            <a:r>
+              <a:rPr lang="en-US" altLang="zh-CN" sz="1500" dirty="0"/>
+              <a:t>Here</a:t>
+            </a:r>
+            <a:r>
+              <a:rPr lang="zh-CN" altLang="en-US" sz="1500" dirty="0"/>
+              <a:t> </a:t>
+            </a:r>
+            <a:r>
+              <a:rPr lang="en-US" altLang="zh-CN" sz="1500" dirty="0"/>
+              <a:t>we</a:t>
+            </a:r>
+            <a:r>
+              <a:rPr lang="zh-CN" altLang="en-US" sz="1500" dirty="0"/>
+              <a:t> </a:t>
+            </a:r>
+            <a:r>
+              <a:rPr lang="en-US" altLang="zh-CN" sz="1500" dirty="0"/>
+              <a:t>consider</a:t>
+            </a:r>
+            <a:r>
+              <a:rPr lang="zh-CN" altLang="en-US" sz="1500" dirty="0"/>
+              <a:t> </a:t>
+            </a:r>
+            <a:r>
+              <a:rPr lang="en-US" altLang="zh-CN" sz="1500" dirty="0"/>
+              <a:t>2</a:t>
+            </a:r>
+            <a:r>
+              <a:rPr lang="zh-CN" altLang="en-US" sz="1500" dirty="0"/>
+              <a:t> </a:t>
+            </a:r>
+            <a:r>
+              <a:rPr lang="en-US" altLang="zh-CN" sz="1500" dirty="0"/>
+              <a:t>strength</a:t>
+            </a:r>
+            <a:r>
+              <a:rPr lang="zh-CN" altLang="en-US" sz="1500" dirty="0"/>
+              <a:t> </a:t>
+            </a:r>
+            <a:r>
+              <a:rPr lang="en-US" altLang="zh-CN" sz="1500" dirty="0"/>
               <a:t>predictors</a:t>
             </a:r>
             <a:r>
-              <a:rPr lang="zh-CN" altLang="en-US" sz="1800" dirty="0"/>
-              <a:t> </a:t>
-            </a:r>
-            <a:r>
-              <a:rPr lang="en-US" altLang="zh-CN" sz="1800" dirty="0"/>
-              <a:t>are</a:t>
-            </a:r>
-            <a:r>
-              <a:rPr lang="zh-CN" altLang="en-US" sz="1800" dirty="0"/>
-              <a:t> </a:t>
-            </a:r>
-            <a:r>
-              <a:rPr lang="en-US" altLang="zh-CN" sz="1800" dirty="0"/>
-              <a:t>200,</a:t>
-            </a:r>
-            <a:r>
-              <a:rPr lang="zh-CN" altLang="en-US" sz="1800" dirty="0"/>
-              <a:t> </a:t>
-            </a:r>
-            <a:r>
-              <a:rPr lang="en-US" altLang="zh-CN" sz="1800" dirty="0"/>
-              <a:t>where</a:t>
-            </a:r>
-            <a:r>
-              <a:rPr lang="zh-CN" altLang="en-US" sz="1800" dirty="0"/>
-              <a:t> </a:t>
-            </a:r>
-            <a:r>
-              <a:rPr lang="en-US" altLang="zh-CN" sz="1800" dirty="0"/>
-              <a:t>100</a:t>
-            </a:r>
-            <a:r>
-              <a:rPr lang="zh-CN" altLang="en-US" sz="1800" dirty="0"/>
-              <a:t> </a:t>
-            </a:r>
-            <a:r>
-              <a:rPr lang="en-US" altLang="zh-CN" sz="1800" dirty="0"/>
-              <a:t>are</a:t>
-            </a:r>
-            <a:r>
-              <a:rPr lang="zh-CN" altLang="en-US" sz="1800" dirty="0"/>
-              <a:t> </a:t>
-            </a:r>
-            <a:r>
-              <a:rPr lang="en-US" altLang="zh-CN" sz="1800" dirty="0"/>
-              <a:t>noise</a:t>
-            </a:r>
-            <a:r>
-              <a:rPr lang="zh-CN" altLang="en-US" sz="1800" dirty="0"/>
-              <a:t> </a:t>
-            </a:r>
-            <a:r>
-              <a:rPr lang="en-US" altLang="zh-CN" sz="1800" dirty="0"/>
-              <a:t>predictors.</a:t>
-            </a:r>
-          </a:p>
-          <a:p>
-            <a:r>
-              <a:rPr lang="zh-CN" altLang="en-US" sz="1800" dirty="0"/>
-              <a:t> </a:t>
-            </a:r>
-            <a:r>
-              <a:rPr lang="en-US" altLang="zh-CN" sz="1800" dirty="0"/>
-              <a:t>Here</a:t>
-            </a:r>
-            <a:r>
-              <a:rPr lang="zh-CN" altLang="en-US" sz="1800" dirty="0"/>
-              <a:t> </a:t>
-            </a:r>
-            <a:r>
-              <a:rPr lang="en-US" altLang="zh-CN" sz="1800" dirty="0"/>
-              <a:t>we</a:t>
-            </a:r>
-            <a:r>
-              <a:rPr lang="zh-CN" altLang="en-US" sz="1800" dirty="0"/>
-              <a:t> </a:t>
-            </a:r>
-            <a:r>
-              <a:rPr lang="en-US" altLang="zh-CN" sz="1800" dirty="0"/>
-              <a:t>consider</a:t>
-            </a:r>
-            <a:r>
-              <a:rPr lang="zh-CN" altLang="en-US" sz="1800" dirty="0"/>
-              <a:t> </a:t>
-            </a:r>
-            <a:r>
-              <a:rPr lang="en-US" altLang="zh-CN" sz="1800" dirty="0"/>
-              <a:t>2</a:t>
-            </a:r>
-            <a:r>
-              <a:rPr lang="zh-CN" altLang="en-US" sz="1800" dirty="0"/>
-              <a:t> </a:t>
-            </a:r>
-            <a:r>
-              <a:rPr lang="en-US" altLang="zh-CN" sz="1800" dirty="0"/>
-              <a:t>strength</a:t>
-            </a:r>
-            <a:r>
-              <a:rPr lang="zh-CN" altLang="en-US" sz="1800" dirty="0"/>
-              <a:t> </a:t>
-            </a:r>
-            <a:r>
-              <a:rPr lang="en-US" altLang="zh-CN" sz="1800" dirty="0"/>
-              <a:t>predictors</a:t>
-            </a:r>
-            <a:r>
-              <a:rPr lang="zh-CN" altLang="en-US" sz="1800" dirty="0"/>
-              <a:t> </a:t>
-            </a:r>
-            <a:r>
-              <a:rPr lang="en-US" altLang="zh-CN" sz="1800" dirty="0"/>
+              <a:rPr lang="zh-CN" altLang="en-US" sz="1500" dirty="0"/>
+              <a:t> </a:t>
+            </a:r>
+            <a:r>
+              <a:rPr lang="en-US" altLang="zh-CN" sz="1500" dirty="0"/>
               <a:t>ratio</a:t>
             </a:r>
             <a:r>
-              <a:rPr lang="zh-CN" altLang="en-US" sz="1800" dirty="0"/>
-              <a:t> </a:t>
+              <a:rPr lang="zh-CN" altLang="en-US" sz="1500" dirty="0"/>
+              <a:t> </a:t>
+            </a:r>
+            <a:r>
+              <a:rPr lang="en-US" altLang="zh-CN" sz="1400" dirty="0"/>
+              <a:t>(</a:t>
+            </a:r>
+            <a:r>
+              <a:rPr lang="zh-CN" altLang="en-US" sz="1400" dirty="0"/>
+              <a:t> </a:t>
+            </a:r>
+            <a:r>
+              <a:rPr lang="en-US" altLang="zh-CN" sz="1400" dirty="0"/>
+              <a:t>r:</a:t>
+            </a:r>
+            <a:r>
+              <a:rPr lang="en-US" sz="1400" dirty="0"/>
+              <a:t> strength</a:t>
+            </a:r>
+            <a:r>
+              <a:rPr lang="en-US" altLang="zh-CN" sz="1400" dirty="0"/>
+              <a:t>:</a:t>
+            </a:r>
+            <a:r>
+              <a:rPr lang="zh-CN" altLang="en-US" sz="1400" dirty="0"/>
+              <a:t> </a:t>
+            </a:r>
+            <a:r>
+              <a:rPr lang="en-US" altLang="zh-CN" sz="1400" dirty="0" err="1"/>
+              <a:t>weak_but_correlated</a:t>
+            </a:r>
+            <a:r>
+              <a:rPr lang="en-US" altLang="zh-CN" sz="1400" dirty="0"/>
+              <a:t>:</a:t>
+            </a:r>
+            <a:r>
+              <a:rPr lang="zh-CN" altLang="en-US" sz="1400" dirty="0"/>
+              <a:t> </a:t>
+            </a:r>
+            <a:r>
+              <a:rPr lang="en-US" altLang="zh-CN" sz="1400" dirty="0" err="1"/>
+              <a:t>weak_and_independent</a:t>
+            </a:r>
+            <a:r>
+              <a:rPr lang="en-US" altLang="zh-CN" sz="1400" dirty="0"/>
+              <a:t> )</a:t>
             </a:r>
             <a:endParaRPr lang="en-US" altLang="zh-CN" sz="1800" dirty="0"/>
-          </a:p>
-          <a:p>
-            <a:r>
-              <a:rPr lang="en-US" altLang="zh-CN" sz="1800" dirty="0"/>
-              <a:t>(</a:t>
-            </a:r>
-            <a:r>
-              <a:rPr lang="zh-CN" altLang="en-US" sz="1800" dirty="0"/>
-              <a:t> </a:t>
-            </a:r>
-            <a:r>
-              <a:rPr lang="en-US" altLang="zh-CN" sz="1800" dirty="0"/>
-              <a:t>r:</a:t>
-            </a:r>
-            <a:r>
-              <a:rPr lang="en-US" sz="1800" dirty="0"/>
-              <a:t> strength</a:t>
-            </a:r>
-            <a:r>
-              <a:rPr lang="en-US" altLang="zh-CN" sz="1800" dirty="0"/>
-              <a:t>:</a:t>
-            </a:r>
-            <a:r>
-              <a:rPr lang="zh-CN" altLang="en-US" sz="1800" dirty="0"/>
-              <a:t> </a:t>
-            </a:r>
-            <a:r>
-              <a:rPr lang="en-US" altLang="zh-CN" sz="1800" dirty="0" err="1"/>
-              <a:t>weak_but_correlated</a:t>
-            </a:r>
-            <a:r>
-              <a:rPr lang="en-US" altLang="zh-CN" sz="1800" dirty="0"/>
-              <a:t>:</a:t>
-            </a:r>
-            <a:r>
-              <a:rPr lang="zh-CN" altLang="en-US" sz="1800" dirty="0"/>
-              <a:t> </a:t>
-            </a:r>
-            <a:r>
-              <a:rPr lang="en-US" altLang="zh-CN" sz="1800" dirty="0" err="1"/>
-              <a:t>weak_and_independent</a:t>
-            </a:r>
-            <a:r>
-              <a:rPr lang="en-US" altLang="zh-CN" sz="1800" dirty="0"/>
-              <a:t> )</a:t>
-            </a:r>
           </a:p>
           <a:p>
             <a:r>
@@ -8371,68 +9177,68 @@
               <a:t>	</a:t>
             </a:r>
             <a:r>
-              <a:rPr lang="en-US" altLang="zh-CN" sz="1800" dirty="0"/>
+              <a:rPr lang="en-US" altLang="zh-CN" dirty="0"/>
               <a:t>1)</a:t>
             </a:r>
             <a:r>
-              <a:rPr lang="zh-CN" altLang="en-US" sz="1800" dirty="0"/>
-              <a:t> </a:t>
-            </a:r>
-            <a:r>
-              <a:rPr lang="en-US" altLang="zh-CN" sz="1800" dirty="0"/>
+              <a:rPr lang="zh-CN" altLang="en-US" dirty="0"/>
+              <a:t> </a:t>
+            </a:r>
+            <a:r>
+              <a:rPr lang="en-US" altLang="zh-CN" dirty="0"/>
               <a:t>r</a:t>
             </a:r>
             <a:r>
-              <a:rPr lang="en-US" sz="1800" dirty="0"/>
+              <a:rPr lang="en-US" dirty="0"/>
               <a:t> = 5</a:t>
             </a:r>
             <a:r>
-              <a:rPr lang="en-US" altLang="zh-CN" sz="1800" dirty="0"/>
+              <a:rPr lang="en-US" altLang="zh-CN" dirty="0"/>
               <a:t>:</a:t>
             </a:r>
             <a:r>
-              <a:rPr lang="en-US" sz="1800" dirty="0"/>
+              <a:rPr lang="en-US" dirty="0"/>
               <a:t>1</a:t>
             </a:r>
             <a:r>
-              <a:rPr lang="en-US" altLang="zh-CN" sz="1800" dirty="0"/>
+              <a:rPr lang="en-US" altLang="zh-CN" dirty="0"/>
               <a:t>:</a:t>
             </a:r>
             <a:r>
-              <a:rPr lang="en-US" sz="1800" dirty="0"/>
+              <a:rPr lang="en-US" dirty="0"/>
               <a:t>4</a:t>
             </a:r>
           </a:p>
           <a:p>
             <a:r>
-              <a:rPr lang="en-US" sz="1800" dirty="0"/>
+              <a:rPr lang="en-US" dirty="0"/>
               <a:t>	</a:t>
             </a:r>
             <a:r>
-              <a:rPr lang="en-US" altLang="zh-CN" sz="1800" dirty="0"/>
+              <a:rPr lang="en-US" altLang="zh-CN" dirty="0"/>
               <a:t>2)</a:t>
             </a:r>
             <a:r>
-              <a:rPr lang="zh-CN" altLang="en-US" sz="1800" dirty="0"/>
-              <a:t> </a:t>
-            </a:r>
-            <a:r>
-              <a:rPr lang="en-US" altLang="zh-CN" sz="1800" dirty="0"/>
+              <a:rPr lang="zh-CN" altLang="en-US" dirty="0"/>
+              <a:t> </a:t>
+            </a:r>
+            <a:r>
+              <a:rPr lang="en-US" altLang="zh-CN" dirty="0"/>
               <a:t>r</a:t>
             </a:r>
             <a:r>
-              <a:rPr lang="zh-CN" altLang="en-US" sz="1800" dirty="0"/>
-              <a:t> </a:t>
-            </a:r>
-            <a:r>
-              <a:rPr lang="en-US" sz="1800" dirty="0"/>
+              <a:rPr lang="zh-CN" altLang="en-US" dirty="0"/>
+              <a:t> </a:t>
+            </a:r>
+            <a:r>
+              <a:rPr lang="en-US" dirty="0"/>
               <a:t>= 5</a:t>
             </a:r>
             <a:r>
-              <a:rPr lang="en-US" altLang="zh-CN" sz="1800" dirty="0"/>
+              <a:rPr lang="en-US" altLang="zh-CN" dirty="0"/>
               <a:t>:3:2</a:t>
             </a:r>
-            <a:endParaRPr lang="en-US" sz="2000" dirty="0"/>
+            <a:endParaRPr lang="en-US" sz="1800" dirty="0"/>
           </a:p>
           <a:p>
             <a:r>
@@ -8652,103 +9458,22 @@
           <a:lstStyle/>
           <a:p>
             <a:r>
-              <a:rPr lang="en-US" dirty="0"/>
-              <a:t>the simulated population needs to meet following characteristics</a:t>
-            </a:r>
-            <a:r>
-              <a:rPr lang="en-US" altLang="zh-CN" dirty="0"/>
-              <a:t>.</a:t>
-            </a:r>
-          </a:p>
-          <a:p>
-            <a:r>
-              <a:rPr lang="en-US" dirty="0"/>
-              <a:t>Firstly,</a:t>
-            </a:r>
-            <a:r>
-              <a:rPr lang="zh-CN" altLang="en-US" dirty="0"/>
-              <a:t> </a:t>
-            </a:r>
-            <a:r>
-              <a:rPr lang="en-US" dirty="0"/>
-              <a:t>the expectation of outcome variable</a:t>
-            </a:r>
-            <a:r>
-              <a:rPr lang="zh-CN" altLang="en-US" dirty="0"/>
-              <a:t> </a:t>
-            </a:r>
-            <a:r>
-              <a:rPr lang="en-US" dirty="0"/>
-              <a:t>is the linear combination of predictors with </a:t>
-            </a:r>
-            <a:r>
-              <a:rPr lang="en-US" altLang="zh-CN" dirty="0"/>
-              <a:t>a</a:t>
-            </a:r>
-            <a:r>
-              <a:rPr lang="en-US" dirty="0"/>
-              <a:t> constant-variance error term; </a:t>
-            </a:r>
-          </a:p>
-          <a:p>
-            <a:r>
-              <a:rPr lang="en-US" dirty="0"/>
-              <a:t>Secondly, the predictors are</a:t>
-            </a:r>
-            <a:r>
-              <a:rPr lang="zh-CN" altLang="en-US" dirty="0"/>
-              <a:t> </a:t>
-            </a:r>
-            <a:r>
-              <a:rPr lang="en-US" dirty="0"/>
-              <a:t>mutually correlated, </a:t>
-            </a:r>
-          </a:p>
-          <a:p>
-            <a:endParaRPr lang="en-US" dirty="0"/>
-          </a:p>
-          <a:p>
-            <a:r>
-              <a:rPr lang="en-US" altLang="zh-CN" dirty="0"/>
-              <a:t>In</a:t>
-            </a:r>
-            <a:r>
-              <a:rPr lang="zh-CN" altLang="en-US" dirty="0"/>
-              <a:t> </a:t>
-            </a:r>
-            <a:r>
-              <a:rPr lang="en-US" altLang="zh-CN" dirty="0"/>
-              <a:t>order</a:t>
-            </a:r>
-            <a:r>
-              <a:rPr lang="zh-CN" altLang="en-US" dirty="0"/>
-              <a:t> </a:t>
-            </a:r>
-            <a:r>
-              <a:rPr lang="en-US" altLang="zh-CN" dirty="0"/>
-              <a:t>to</a:t>
-            </a:r>
-            <a:r>
-              <a:rPr lang="zh-CN" altLang="en-US" dirty="0"/>
-              <a:t> </a:t>
-            </a:r>
-            <a:r>
-              <a:rPr lang="en-US" altLang="zh-CN" dirty="0"/>
-              <a:t>compare</a:t>
-            </a:r>
-            <a:r>
-              <a:rPr lang="zh-CN" altLang="en-US" dirty="0"/>
-              <a:t> </a:t>
-            </a:r>
-            <a:r>
-              <a:rPr lang="en-US" altLang="zh-CN" dirty="0"/>
-              <a:t>the</a:t>
-            </a:r>
-            <a:r>
-              <a:rPr lang="zh-CN" altLang="en-US" dirty="0"/>
-              <a:t> </a:t>
-            </a:r>
-            <a:endParaRPr lang="en-US" dirty="0"/>
+              <a:rPr lang="en-US" sz="1800" dirty="0"/>
+              <a:t>﻿4.1 Distribution of </a:t>
+            </a:r>
+            <a:r>
+              <a:rPr lang="en-US" altLang="zh-CN" sz="1800" dirty="0"/>
+              <a:t>response</a:t>
+            </a:r>
+            <a:r>
+              <a:rPr lang="zh-CN" altLang="en-US" sz="1800" dirty="0"/>
+              <a:t> </a:t>
+            </a:r>
+            <a:r>
+              <a:rPr lang="en-US" altLang="zh-CN" sz="1800" dirty="0"/>
+              <a:t>variable</a:t>
+            </a:r>
+            <a:endParaRPr lang="en-US" sz="1800" dirty="0"/>
           </a:p>
         </p:txBody>
       </p:sp>
@@ -8810,6 +9535,66 @@
           </a:p>
         </p:txBody>
       </p:sp>
+      <p:pic>
+        <p:nvPicPr>
+          <p:cNvPr id="6" name="Picture 5" descr="A close up of a logo&#10;&#10;Description automatically generated">
+            <a:extLst>
+              <a:ext uri="{FF2B5EF4-FFF2-40B4-BE49-F238E27FC236}">
+                <a16:creationId xmlns:a16="http://schemas.microsoft.com/office/drawing/2014/main" id="{2C10D75B-BF97-B947-B678-DF1B36ABF207}"/>
+              </a:ext>
+            </a:extLst>
+          </p:cNvPr>
+          <p:cNvPicPr>
+            <a:picLocks noChangeAspect="1"/>
+          </p:cNvPicPr>
+          <p:nvPr/>
+        </p:nvPicPr>
+        <p:blipFill>
+          <a:blip r:embed="rId2"/>
+          <a:stretch>
+            <a:fillRect/>
+          </a:stretch>
+        </p:blipFill>
+        <p:spPr>
+          <a:xfrm>
+            <a:off x="3486150" y="3092450"/>
+            <a:ext cx="1891628" cy="586294"/>
+          </a:xfrm>
+          <a:prstGeom prst="rect">
+            <a:avLst/>
+          </a:prstGeom>
+        </p:spPr>
+      </p:pic>
+      <p:pic>
+        <p:nvPicPr>
+          <p:cNvPr id="8" name="Picture 7">
+            <a:extLst>
+              <a:ext uri="{FF2B5EF4-FFF2-40B4-BE49-F238E27FC236}">
+                <a16:creationId xmlns:a16="http://schemas.microsoft.com/office/drawing/2014/main" id="{64F81B26-5B70-5E49-846A-A6DD9B73480A}"/>
+              </a:ext>
+            </a:extLst>
+          </p:cNvPr>
+          <p:cNvPicPr>
+            <a:picLocks noChangeAspect="1"/>
+          </p:cNvPicPr>
+          <p:nvPr/>
+        </p:nvPicPr>
+        <p:blipFill>
+          <a:blip r:embed="rId3"/>
+          <a:stretch>
+            <a:fillRect/>
+          </a:stretch>
+        </p:blipFill>
+        <p:spPr>
+          <a:xfrm>
+            <a:off x="571316" y="4001227"/>
+            <a:ext cx="8458016" cy="586294"/>
+          </a:xfrm>
+          <a:prstGeom prst="rect">
+            <a:avLst/>
+          </a:prstGeom>
+        </p:spPr>
+      </p:pic>
     </p:spTree>
     <p:extLst>
       <p:ext uri="{BB962C8B-B14F-4D97-AF65-F5344CB8AC3E}">
@@ -8868,7 +9653,246 @@
           </a:bodyPr>
           <a:lstStyle/>
           <a:p>
-            <a:endParaRPr lang="en-US" sz="1800" dirty="0"/>
+            <a:r>
+              <a:rPr lang="en-US" sz="1800" dirty="0"/>
+              <a:t>﻿4.</a:t>
+            </a:r>
+            <a:r>
+              <a:rPr lang="en-US" altLang="zh-CN" sz="1800" dirty="0"/>
+              <a:t>2</a:t>
+            </a:r>
+            <a:r>
+              <a:rPr lang="en-US" sz="1800" dirty="0"/>
+              <a:t> </a:t>
+            </a:r>
+            <a:r>
+              <a:rPr lang="en-US" altLang="zh-CN" sz="1800" dirty="0"/>
+              <a:t>Data</a:t>
+            </a:r>
+            <a:r>
+              <a:rPr lang="zh-CN" altLang="en-US" sz="1800" dirty="0"/>
+              <a:t> </a:t>
+            </a:r>
+            <a:r>
+              <a:rPr lang="en-US" altLang="zh-CN" sz="1800" dirty="0"/>
+              <a:t>generating</a:t>
+            </a:r>
+            <a:r>
+              <a:rPr lang="zh-CN" altLang="en-US" sz="1800" dirty="0"/>
+              <a:t> </a:t>
+            </a:r>
+            <a:r>
+              <a:rPr lang="en-US" altLang="zh-CN" sz="1800" dirty="0"/>
+              <a:t>with</a:t>
+            </a:r>
+            <a:r>
+              <a:rPr lang="zh-CN" altLang="en-US" sz="1800" dirty="0"/>
+              <a:t> </a:t>
+            </a:r>
+            <a:r>
+              <a:rPr lang="en-US" altLang="zh-CN" sz="1800" dirty="0"/>
+              <a:t>pre-defined</a:t>
+            </a:r>
+            <a:r>
+              <a:rPr lang="zh-CN" altLang="en-US" sz="1800" dirty="0"/>
+              <a:t> </a:t>
+            </a:r>
+            <a:r>
+              <a:rPr lang="en-US" altLang="zh-CN" sz="1800" dirty="0"/>
+              <a:t>correlation</a:t>
+            </a:r>
+          </a:p>
+          <a:p>
+            <a:pPr marL="285750" indent="-285750">
+              <a:buFont typeface="Arial" panose="020B0604020202020204" pitchFamily="34" charset="0"/>
+              <a:buChar char="•"/>
+            </a:pPr>
+            <a:r>
+              <a:rPr lang="en-US" dirty="0"/>
+              <a:t>﻿The data of predictors are generated by R function</a:t>
+            </a:r>
+            <a:r>
+              <a:rPr lang="zh-CN" altLang="en-US" dirty="0"/>
+              <a:t> </a:t>
+            </a:r>
+            <a:r>
+              <a:rPr lang="en-US" b="1" dirty="0" err="1"/>
+              <a:t>mvrnorm</a:t>
+            </a:r>
+            <a:r>
+              <a:rPr lang="en-US" altLang="zh-CN" b="1" dirty="0"/>
+              <a:t>(</a:t>
+            </a:r>
+            <a:r>
+              <a:rPr lang="zh-CN" altLang="en-US" b="1" dirty="0"/>
+              <a:t> </a:t>
+            </a:r>
+            <a:r>
+              <a:rPr lang="en-US" altLang="zh-CN" b="1" dirty="0"/>
+              <a:t>)</a:t>
+            </a:r>
+            <a:r>
+              <a:rPr lang="en-US" b="1" dirty="0"/>
+              <a:t>. </a:t>
+            </a:r>
+          </a:p>
+          <a:p>
+            <a:pPr marL="285750" indent="-285750">
+              <a:buFont typeface="Arial" panose="020B0604020202020204" pitchFamily="34" charset="0"/>
+              <a:buChar char="•"/>
+            </a:pPr>
+            <a:r>
+              <a:rPr lang="en-US" altLang="zh-CN" dirty="0"/>
+              <a:t>T</a:t>
+            </a:r>
+            <a:r>
+              <a:rPr lang="en-US" dirty="0"/>
+              <a:t>o change the correlation between</a:t>
+            </a:r>
+            <a:r>
+              <a:rPr lang="zh-CN" altLang="en-US" dirty="0"/>
+              <a:t> </a:t>
+            </a:r>
+            <a:r>
+              <a:rPr lang="en-US" dirty="0"/>
+              <a:t>different predictors</a:t>
+            </a:r>
+            <a:r>
+              <a:rPr lang="en-US" altLang="zh-CN" dirty="0"/>
+              <a:t>:</a:t>
+            </a:r>
+            <a:r>
+              <a:rPr lang="zh-CN" altLang="en-US" dirty="0"/>
+              <a:t> </a:t>
+            </a:r>
+            <a:endParaRPr lang="en-US" altLang="zh-CN" dirty="0"/>
+          </a:p>
+          <a:p>
+            <a:pPr marL="800100" lvl="1" indent="-285750"/>
+            <a:r>
+              <a:rPr lang="en-US" altLang="zh-CN" dirty="0"/>
+              <a:t>Pass</a:t>
+            </a:r>
+            <a:r>
+              <a:rPr lang="zh-CN" altLang="en-US" dirty="0"/>
+              <a:t> </a:t>
+            </a:r>
+            <a:r>
+              <a:rPr lang="en-US" dirty="0"/>
+              <a:t>a pre-defined covariance matrix </a:t>
+            </a:r>
+            <a:r>
+              <a:rPr lang="en-US" dirty="0" err="1"/>
+              <a:t>mvrnorm</a:t>
+            </a:r>
+            <a:r>
+              <a:rPr lang="en-US" altLang="zh-CN" dirty="0"/>
+              <a:t>(</a:t>
+            </a:r>
+            <a:r>
+              <a:rPr lang="zh-CN" altLang="en-US" dirty="0"/>
+              <a:t> </a:t>
+            </a:r>
+            <a:r>
+              <a:rPr lang="en-US" altLang="zh-CN" dirty="0"/>
+              <a:t>)</a:t>
+            </a:r>
+            <a:r>
+              <a:rPr lang="zh-CN" altLang="en-US" dirty="0"/>
+              <a:t> </a:t>
+            </a:r>
+            <a:r>
+              <a:rPr lang="en-US" dirty="0"/>
+              <a:t>function.</a:t>
+            </a:r>
+          </a:p>
+          <a:p>
+            <a:pPr marL="800100" lvl="1" indent="-285750"/>
+            <a:r>
+              <a:rPr lang="en-US" dirty="0"/>
+              <a:t>Here we consider a certain</a:t>
+            </a:r>
+            <a:r>
+              <a:rPr lang="zh-CN" altLang="en-US" dirty="0"/>
+              <a:t> </a:t>
+            </a:r>
+            <a:r>
+              <a:rPr lang="en-US" dirty="0"/>
+              <a:t>scenario: </a:t>
+            </a:r>
+          </a:p>
+          <a:p>
+            <a:pPr marL="1143000" lvl="2" indent="-285750"/>
+            <a:r>
+              <a:rPr lang="en-US" altLang="zh-CN" dirty="0"/>
+              <a:t>S</a:t>
+            </a:r>
+            <a:r>
+              <a:rPr lang="en-US" dirty="0"/>
+              <a:t>trong variables and </a:t>
+            </a:r>
+            <a:r>
+              <a:rPr lang="en-US" altLang="zh-CN" dirty="0"/>
+              <a:t>part</a:t>
+            </a:r>
+            <a:r>
+              <a:rPr lang="zh-CN" altLang="en-US" dirty="0"/>
+              <a:t> </a:t>
+            </a:r>
+            <a:r>
+              <a:rPr lang="en-US" dirty="0"/>
+              <a:t>of weak variables are indepen</a:t>
+            </a:r>
+            <a:r>
+              <a:rPr lang="en-US" altLang="zh-CN" dirty="0"/>
+              <a:t>den</a:t>
+            </a:r>
+            <a:r>
+              <a:rPr lang="en-US" dirty="0"/>
+              <a:t>t</a:t>
+            </a:r>
+            <a:r>
+              <a:rPr lang="en-US" altLang="zh-CN" dirty="0"/>
+              <a:t>;</a:t>
+            </a:r>
+          </a:p>
+          <a:p>
+            <a:pPr marL="1143000" lvl="2" indent="-285750"/>
+            <a:r>
+              <a:rPr lang="en-US" altLang="zh-CN" dirty="0"/>
+              <a:t>O</a:t>
+            </a:r>
+            <a:r>
+              <a:rPr lang="en-US" dirty="0"/>
+              <a:t>ther</a:t>
+            </a:r>
+            <a:r>
+              <a:rPr lang="zh-CN" altLang="en-US" dirty="0"/>
+              <a:t> </a:t>
+            </a:r>
+            <a:r>
+              <a:rPr lang="en-US" dirty="0"/>
+              <a:t>weak predictors are correlated with </a:t>
+            </a:r>
+            <a:r>
+              <a:rPr lang="en-US" altLang="zh-CN" dirty="0"/>
+              <a:t>one</a:t>
+            </a:r>
+            <a:r>
+              <a:rPr lang="en-US" dirty="0"/>
+              <a:t> specific strong variable. </a:t>
+            </a:r>
+          </a:p>
+          <a:p>
+            <a:pPr marL="1143000" lvl="2" indent="-285750"/>
+            <a:r>
+              <a:rPr lang="en-US" altLang="zh-CN" dirty="0"/>
+              <a:t>R</a:t>
+            </a:r>
+            <a:r>
+              <a:rPr lang="en-US" dirty="0"/>
+              <a:t>estrict one strong predictor can only be correlated with one weak predictor</a:t>
+            </a:r>
           </a:p>
         </p:txBody>
       </p:sp>
@@ -8895,7 +9919,7 @@
           <a:p>
             <a:r>
               <a:rPr lang="en-US" dirty="0"/>
-              <a:t>Methods for generating data</a:t>
+              <a:t>4 Methods for generating data</a:t>
             </a:r>
           </a:p>
         </p:txBody>
@@ -8933,7 +9957,7 @@
     </p:spTree>
     <p:extLst>
       <p:ext uri="{BB962C8B-B14F-4D97-AF65-F5344CB8AC3E}">
-        <p14:creationId xmlns:p14="http://schemas.microsoft.com/office/powerpoint/2010/main" val="847249299"/>
+        <p14:creationId xmlns:p14="http://schemas.microsoft.com/office/powerpoint/2010/main" val="2465790282"/>
       </p:ext>
     </p:extLst>
   </p:cSld>
@@ -8965,7 +9989,7 @@
           <p:cNvPr id="2" name="Text Placeholder 1">
             <a:extLst>
               <a:ext uri="{FF2B5EF4-FFF2-40B4-BE49-F238E27FC236}">
-                <a16:creationId xmlns:a16="http://schemas.microsoft.com/office/drawing/2014/main" id="{7810FCFE-4A3E-3C4A-B610-DFFEE6DDC87F}"/>
+                <a16:creationId xmlns:a16="http://schemas.microsoft.com/office/drawing/2014/main" id="{5664731D-935A-E747-B573-BE2F9FA6678D}"/>
               </a:ext>
             </a:extLst>
           </p:cNvPr>
@@ -8973,15 +9997,199 @@
             <a:spLocks noGrp="1"/>
           </p:cNvSpPr>
           <p:nvPr>
-            <p:ph type="body" sz="quarter" idx="16"/>
+            <p:ph type="body" sz="quarter" idx="12"/>
           </p:nvPr>
         </p:nvSpPr>
-        <p:spPr/>
+        <p:spPr>
+          <a:xfrm>
+            <a:off x="685984" y="2128761"/>
+            <a:ext cx="8572684" cy="4309202"/>
+          </a:xfrm>
+        </p:spPr>
         <p:txBody>
-          <a:bodyPr/>
+          <a:bodyPr>
+            <a:normAutofit/>
+          </a:bodyPr>
           <a:lstStyle/>
           <a:p>
-            <a:endParaRPr lang="en-US"/>
+            <a:r>
+              <a:rPr lang="en-US" altLang="zh-CN" sz="1800" dirty="0"/>
+              <a:t>5.1</a:t>
+            </a:r>
+            <a:r>
+              <a:rPr lang="zh-CN" altLang="en-US" sz="1800" dirty="0"/>
+              <a:t> </a:t>
+            </a:r>
+            <a:r>
+              <a:rPr lang="en-US" altLang="zh-CN" sz="1800" dirty="0"/>
+              <a:t>﻿Predictor identification performance</a:t>
+            </a:r>
+          </a:p>
+          <a:p>
+            <a:endParaRPr lang="en-US" sz="1800" dirty="0"/>
+          </a:p>
+          <a:p>
+            <a:endParaRPr lang="en-US" sz="1800" dirty="0"/>
+          </a:p>
+          <a:p>
+            <a:endParaRPr lang="en-US" sz="1800" dirty="0"/>
+          </a:p>
+          <a:p>
+            <a:endParaRPr lang="en-US" sz="1800" dirty="0"/>
+          </a:p>
+          <a:p>
+            <a:endParaRPr lang="en-US" sz="1800" dirty="0"/>
+          </a:p>
+          <a:p>
+            <a:r>
+              <a:rPr lang="en-US" altLang="zh-CN" sz="1800" dirty="0"/>
+              <a:t>	F1</a:t>
+            </a:r>
+            <a:r>
+              <a:rPr lang="zh-CN" altLang="en-US" sz="1800" dirty="0"/>
+              <a:t> </a:t>
+            </a:r>
+            <a:r>
+              <a:rPr lang="en-US" altLang="zh-CN" sz="1800" dirty="0"/>
+              <a:t>score</a:t>
+            </a:r>
+            <a:r>
+              <a:rPr lang="zh-CN" altLang="en-US" sz="1800" dirty="0"/>
+              <a:t> </a:t>
+            </a:r>
+            <a:r>
+              <a:rPr lang="en-US" altLang="zh-CN" sz="1800" dirty="0"/>
+              <a:t>is</a:t>
+            </a:r>
+            <a:r>
+              <a:rPr lang="zh-CN" altLang="en-US" sz="1800" dirty="0"/>
+              <a:t> </a:t>
+            </a:r>
+            <a:r>
+              <a:rPr lang="en-US" altLang="zh-CN" sz="1800" dirty="0"/>
+              <a:t>calculated</a:t>
+            </a:r>
+            <a:r>
+              <a:rPr lang="zh-CN" altLang="en-US" sz="1800" dirty="0"/>
+              <a:t> </a:t>
+            </a:r>
+            <a:r>
+              <a:rPr lang="en-US" altLang="zh-CN" sz="1800" dirty="0"/>
+              <a:t>in</a:t>
+            </a:r>
+            <a:r>
+              <a:rPr lang="zh-CN" altLang="en-US" sz="1800" dirty="0"/>
+              <a:t> </a:t>
+            </a:r>
+            <a:r>
+              <a:rPr lang="en-US" altLang="zh-CN" sz="1800" dirty="0"/>
+              <a:t>3</a:t>
+            </a:r>
+            <a:r>
+              <a:rPr lang="zh-CN" altLang="en-US" sz="1800" dirty="0"/>
+              <a:t> </a:t>
+            </a:r>
+            <a:r>
+              <a:rPr lang="en-US" altLang="zh-CN" sz="1800" dirty="0"/>
+              <a:t>categories</a:t>
+            </a:r>
+            <a:r>
+              <a:rPr lang="zh-CN" altLang="en-US" sz="1800" dirty="0"/>
+              <a:t> </a:t>
+            </a:r>
+            <a:r>
+              <a:rPr lang="en-US" altLang="zh-CN" sz="1800" dirty="0"/>
+              <a:t>separately.</a:t>
+            </a:r>
+            <a:r>
+              <a:rPr lang="zh-CN" altLang="en-US" sz="1800" dirty="0"/>
+              <a:t> </a:t>
+            </a:r>
+            <a:r>
+              <a:rPr lang="en-US" altLang="zh-CN" sz="1800" dirty="0"/>
+              <a:t>In</a:t>
+            </a:r>
+            <a:r>
+              <a:rPr lang="zh-CN" altLang="en-US" sz="1800" dirty="0"/>
+              <a:t> </a:t>
+            </a:r>
+            <a:r>
+              <a:rPr lang="en-US" altLang="zh-CN" sz="1800" dirty="0"/>
+              <a:t>strong</a:t>
+            </a:r>
+            <a:r>
+              <a:rPr lang="zh-CN" altLang="en-US" sz="1800" dirty="0"/>
+              <a:t> </a:t>
+            </a:r>
+            <a:r>
+              <a:rPr lang="en-US" altLang="zh-CN" sz="1800" dirty="0"/>
+              <a:t>cases,</a:t>
+            </a:r>
+            <a:r>
+              <a:rPr lang="zh-CN" altLang="en-US" sz="1800" dirty="0"/>
+              <a:t> </a:t>
+            </a:r>
+            <a:r>
+              <a:rPr lang="en-US" altLang="zh-CN" sz="1800" dirty="0"/>
+              <a:t>positive</a:t>
+            </a:r>
+            <a:r>
+              <a:rPr lang="zh-CN" altLang="en-US" sz="1800" dirty="0"/>
+              <a:t> </a:t>
+            </a:r>
+            <a:r>
+              <a:rPr lang="en-US" altLang="zh-CN" sz="1800" dirty="0"/>
+              <a:t>is?</a:t>
+            </a:r>
+            <a:r>
+              <a:rPr lang="zh-CN" altLang="en-US" sz="1800" dirty="0"/>
+              <a:t> </a:t>
+            </a:r>
+            <a:r>
+              <a:rPr lang="en-US" altLang="zh-CN" sz="1800" dirty="0"/>
+              <a:t>In</a:t>
+            </a:r>
+            <a:r>
+              <a:rPr lang="zh-CN" altLang="en-US" sz="1800" dirty="0"/>
+              <a:t> </a:t>
+            </a:r>
+            <a:r>
+              <a:rPr lang="en-US" altLang="zh-CN" sz="1800" dirty="0"/>
+              <a:t>weak</a:t>
+            </a:r>
+            <a:r>
+              <a:rPr lang="zh-CN" altLang="en-US" sz="1800" dirty="0"/>
+              <a:t> </a:t>
+            </a:r>
+            <a:r>
+              <a:rPr lang="en-US" altLang="zh-CN" sz="1800" dirty="0"/>
+              <a:t>cases,</a:t>
+            </a:r>
+            <a:r>
+              <a:rPr lang="zh-CN" altLang="en-US" sz="1800" dirty="0"/>
+              <a:t> </a:t>
+            </a:r>
+            <a:r>
+              <a:rPr lang="en-US" altLang="zh-CN" sz="1800" dirty="0"/>
+              <a:t>positive</a:t>
+            </a:r>
+            <a:r>
+              <a:rPr lang="zh-CN" altLang="en-US" sz="1800" dirty="0"/>
+              <a:t> </a:t>
+            </a:r>
+            <a:r>
+              <a:rPr lang="en-US" altLang="zh-CN" sz="1800" dirty="0"/>
+              <a:t>is</a:t>
+            </a:r>
+            <a:r>
+              <a:rPr lang="zh-CN" altLang="en-US" sz="1800" dirty="0"/>
+              <a:t> </a:t>
+            </a:r>
+            <a:r>
+              <a:rPr lang="en-US" altLang="zh-CN" sz="1800" dirty="0"/>
+              <a:t>?</a:t>
+            </a:r>
+            <a:endParaRPr lang="en-US" sz="1800" dirty="0"/>
           </a:p>
         </p:txBody>
       </p:sp>
@@ -8990,7 +10198,7 @@
           <p:cNvPr id="3" name="Title 2">
             <a:extLst>
               <a:ext uri="{FF2B5EF4-FFF2-40B4-BE49-F238E27FC236}">
-                <a16:creationId xmlns:a16="http://schemas.microsoft.com/office/drawing/2014/main" id="{EB31DDBC-00AE-AA47-8CE8-918ACDA420FC}"/>
+                <a16:creationId xmlns:a16="http://schemas.microsoft.com/office/drawing/2014/main" id="{D8B5670F-E5A2-DC48-BD74-D934E296554C}"/>
               </a:ext>
             </a:extLst>
           </p:cNvPr>
@@ -9006,7 +10214,27 @@
           <a:bodyPr/>
           <a:lstStyle/>
           <a:p>
-            <a:endParaRPr lang="en-US"/>
+            <a:r>
+              <a:rPr lang="en-US" altLang="zh-CN" dirty="0"/>
+              <a:t>5</a:t>
+            </a:r>
+            <a:r>
+              <a:rPr lang="zh-CN" altLang="en-US" dirty="0"/>
+              <a:t> </a:t>
+            </a:r>
+            <a:r>
+              <a:rPr lang="en-US" altLang="zh-CN" dirty="0"/>
+              <a:t>performance</a:t>
+            </a:r>
+            <a:r>
+              <a:rPr lang="zh-CN" altLang="en-US" dirty="0"/>
+              <a:t> </a:t>
+            </a:r>
+            <a:r>
+              <a:rPr lang="en-US" altLang="zh-CN" dirty="0"/>
+              <a:t>analysis</a:t>
+            </a:r>
+            <a:endParaRPr lang="en-US" dirty="0"/>
           </a:p>
         </p:txBody>
       </p:sp>
@@ -9015,7 +10243,7 @@
           <p:cNvPr id="4" name="Slide Number Placeholder 3">
             <a:extLst>
               <a:ext uri="{FF2B5EF4-FFF2-40B4-BE49-F238E27FC236}">
-                <a16:creationId xmlns:a16="http://schemas.microsoft.com/office/drawing/2014/main" id="{0A38B8D0-C4D5-044C-82F5-D03FE1776217}"/>
+                <a16:creationId xmlns:a16="http://schemas.microsoft.com/office/drawing/2014/main" id="{E7F6E81B-6B87-FC4C-ACD3-7B877A4CBE32}"/>
               </a:ext>
             </a:extLst>
           </p:cNvPr>
@@ -9040,10 +10268,98 @@
           </a:p>
         </p:txBody>
       </p:sp>
+      <p:pic>
+        <p:nvPicPr>
+          <p:cNvPr id="6" name="Picture 5" descr="A screenshot of a cell phone&#10;&#10;Description automatically generated">
+            <a:extLst>
+              <a:ext uri="{FF2B5EF4-FFF2-40B4-BE49-F238E27FC236}">
+                <a16:creationId xmlns:a16="http://schemas.microsoft.com/office/drawing/2014/main" id="{A9EBD504-989A-AC4C-B114-CB07443E60D7}"/>
+              </a:ext>
+            </a:extLst>
+          </p:cNvPr>
+          <p:cNvPicPr>
+            <a:picLocks noChangeAspect="1"/>
+          </p:cNvPicPr>
+          <p:nvPr/>
+        </p:nvPicPr>
+        <p:blipFill>
+          <a:blip r:embed="rId2"/>
+          <a:stretch>
+            <a:fillRect/>
+          </a:stretch>
+        </p:blipFill>
+        <p:spPr>
+          <a:xfrm>
+            <a:off x="2766404" y="2638142"/>
+            <a:ext cx="3496524" cy="777005"/>
+          </a:xfrm>
+          <a:prstGeom prst="rect">
+            <a:avLst/>
+          </a:prstGeom>
+        </p:spPr>
+      </p:pic>
+      <p:pic>
+        <p:nvPicPr>
+          <p:cNvPr id="9" name="Picture 8" descr="A picture containing table&#10;&#10;Description automatically generated">
+            <a:extLst>
+              <a:ext uri="{FF2B5EF4-FFF2-40B4-BE49-F238E27FC236}">
+                <a16:creationId xmlns:a16="http://schemas.microsoft.com/office/drawing/2014/main" id="{0A0C912E-A046-E243-89C8-C858A4321BA8}"/>
+              </a:ext>
+            </a:extLst>
+          </p:cNvPr>
+          <p:cNvPicPr>
+            <a:picLocks noChangeAspect="1"/>
+          </p:cNvPicPr>
+          <p:nvPr/>
+        </p:nvPicPr>
+        <p:blipFill rotWithShape="1">
+          <a:blip r:embed="rId3"/>
+          <a:srcRect t="57449" b="-1"/>
+          <a:stretch/>
+        </p:blipFill>
+        <p:spPr>
+          <a:xfrm>
+            <a:off x="5050118" y="3676760"/>
+            <a:ext cx="1663882" cy="550925"/>
+          </a:xfrm>
+          <a:prstGeom prst="rect">
+            <a:avLst/>
+          </a:prstGeom>
+        </p:spPr>
+      </p:pic>
+      <p:pic>
+        <p:nvPicPr>
+          <p:cNvPr id="10" name="Picture 9" descr="A picture containing table&#10;&#10;Description automatically generated">
+            <a:extLst>
+              <a:ext uri="{FF2B5EF4-FFF2-40B4-BE49-F238E27FC236}">
+                <a16:creationId xmlns:a16="http://schemas.microsoft.com/office/drawing/2014/main" id="{8A54049D-A691-584F-9111-C5F09D4EEEB6}"/>
+              </a:ext>
+            </a:extLst>
+          </p:cNvPr>
+          <p:cNvPicPr>
+            <a:picLocks noChangeAspect="1"/>
+          </p:cNvPicPr>
+          <p:nvPr/>
+        </p:nvPicPr>
+        <p:blipFill rotWithShape="1">
+          <a:blip r:embed="rId3"/>
+          <a:srcRect b="54849"/>
+          <a:stretch/>
+        </p:blipFill>
+        <p:spPr>
+          <a:xfrm>
+            <a:off x="2432798" y="3676760"/>
+            <a:ext cx="1661085" cy="550925"/>
+          </a:xfrm>
+          <a:prstGeom prst="rect">
+            <a:avLst/>
+          </a:prstGeom>
+        </p:spPr>
+      </p:pic>
     </p:spTree>
     <p:extLst>
       <p:ext uri="{BB962C8B-B14F-4D97-AF65-F5344CB8AC3E}">
-        <p14:creationId xmlns:p14="http://schemas.microsoft.com/office/powerpoint/2010/main" val="2348281500"/>
+        <p14:creationId xmlns:p14="http://schemas.microsoft.com/office/powerpoint/2010/main" val="847249299"/>
       </p:ext>
     </p:extLst>
   </p:cSld>

</xml_diff>